<commit_message>
Added thanks & inspiration slide.
</commit_message>
<xml_diff>
--- a/AngularJS Unit Testing.pptx
+++ b/AngularJS Unit Testing.pptx
@@ -5,28 +5,30 @@
     <p:sldMasterId id="2147483660" r:id="rId1"/>
   </p:sldMasterIdLst>
   <p:notesMasterIdLst>
-    <p:notesMasterId r:id="rId21"/>
+    <p:notesMasterId r:id="rId23"/>
   </p:notesMasterIdLst>
   <p:sldIdLst>
     <p:sldId id="256" r:id="rId2"/>
     <p:sldId id="265" r:id="rId3"/>
-    <p:sldId id="257" r:id="rId4"/>
-    <p:sldId id="268" r:id="rId5"/>
-    <p:sldId id="269" r:id="rId6"/>
-    <p:sldId id="270" r:id="rId7"/>
-    <p:sldId id="271" r:id="rId8"/>
-    <p:sldId id="272" r:id="rId9"/>
-    <p:sldId id="266" r:id="rId10"/>
-    <p:sldId id="267" r:id="rId11"/>
-    <p:sldId id="263" r:id="rId12"/>
-    <p:sldId id="275" r:id="rId13"/>
-    <p:sldId id="273" r:id="rId14"/>
-    <p:sldId id="274" r:id="rId15"/>
-    <p:sldId id="276" r:id="rId16"/>
-    <p:sldId id="277" r:id="rId17"/>
-    <p:sldId id="278" r:id="rId18"/>
-    <p:sldId id="279" r:id="rId19"/>
-    <p:sldId id="280" r:id="rId20"/>
+    <p:sldId id="282" r:id="rId4"/>
+    <p:sldId id="257" r:id="rId5"/>
+    <p:sldId id="268" r:id="rId6"/>
+    <p:sldId id="269" r:id="rId7"/>
+    <p:sldId id="270" r:id="rId8"/>
+    <p:sldId id="271" r:id="rId9"/>
+    <p:sldId id="272" r:id="rId10"/>
+    <p:sldId id="266" r:id="rId11"/>
+    <p:sldId id="267" r:id="rId12"/>
+    <p:sldId id="263" r:id="rId13"/>
+    <p:sldId id="275" r:id="rId14"/>
+    <p:sldId id="273" r:id="rId15"/>
+    <p:sldId id="274" r:id="rId16"/>
+    <p:sldId id="276" r:id="rId17"/>
+    <p:sldId id="277" r:id="rId18"/>
+    <p:sldId id="278" r:id="rId19"/>
+    <p:sldId id="279" r:id="rId20"/>
+    <p:sldId id="280" r:id="rId21"/>
+    <p:sldId id="281" r:id="rId22"/>
   </p:sldIdLst>
   <p:sldSz cx="9144000" cy="6858000" type="screen4x3"/>
   <p:notesSz cx="6858000" cy="9144000"/>
@@ -627,7 +629,7 @@
           <a:p>
             <a:fld id="{FF2FE42E-3319-E94E-B451-3D3090BF2088}" type="slidenum">
               <a:rPr lang="en-US" smtClean="0"/>
-              <a:t>13</a:t>
+              <a:t>14</a:t>
             </a:fld>
             <a:endParaRPr lang="en-US"/>
           </a:p>
@@ -711,7 +713,7 @@
           <a:p>
             <a:fld id="{FF2FE42E-3319-E94E-B451-3D3090BF2088}" type="slidenum">
               <a:rPr lang="en-US" smtClean="0"/>
-              <a:t>14</a:t>
+              <a:t>15</a:t>
             </a:fld>
             <a:endParaRPr lang="en-US"/>
           </a:p>
@@ -795,7 +797,7 @@
           <a:p>
             <a:fld id="{FF2FE42E-3319-E94E-B451-3D3090BF2088}" type="slidenum">
               <a:rPr lang="en-US" smtClean="0"/>
-              <a:t>15</a:t>
+              <a:t>16</a:t>
             </a:fld>
             <a:endParaRPr lang="en-US"/>
           </a:p>
@@ -879,7 +881,7 @@
           <a:p>
             <a:fld id="{FF2FE42E-3319-E94E-B451-3D3090BF2088}" type="slidenum">
               <a:rPr lang="en-US" smtClean="0"/>
-              <a:t>16</a:t>
+              <a:t>17</a:t>
             </a:fld>
             <a:endParaRPr lang="en-US"/>
           </a:p>
@@ -963,7 +965,7 @@
           <a:p>
             <a:fld id="{FF2FE42E-3319-E94E-B451-3D3090BF2088}" type="slidenum">
               <a:rPr lang="en-US" smtClean="0"/>
-              <a:t>17</a:t>
+              <a:t>18</a:t>
             </a:fld>
             <a:endParaRPr lang="en-US"/>
           </a:p>
@@ -1047,7 +1049,7 @@
           <a:p>
             <a:fld id="{FF2FE42E-3319-E94E-B451-3D3090BF2088}" type="slidenum">
               <a:rPr lang="en-US" smtClean="0"/>
-              <a:t>18</a:t>
+              <a:t>19</a:t>
             </a:fld>
             <a:endParaRPr lang="en-US"/>
           </a:p>
@@ -1131,7 +1133,91 @@
           <a:p>
             <a:fld id="{FF2FE42E-3319-E94E-B451-3D3090BF2088}" type="slidenum">
               <a:rPr lang="en-US" smtClean="0"/>
-              <a:t>19</a:t>
+              <a:t>20</a:t>
+            </a:fld>
+            <a:endParaRPr lang="en-US"/>
+          </a:p>
+        </p:txBody>
+      </p:sp>
+    </p:spTree>
+    <p:extLst>
+      <p:ext uri="{BB962C8B-B14F-4D97-AF65-F5344CB8AC3E}">
+        <p14:creationId xmlns:p14="http://schemas.microsoft.com/office/powerpoint/2010/main" val="608330645"/>
+      </p:ext>
+    </p:extLst>
+  </p:cSld>
+  <p:clrMapOvr>
+    <a:masterClrMapping/>
+  </p:clrMapOvr>
+</p:notes>
+</file>
+
+<file path=ppt/notesSlides/notesSlide17.xml><?xml version="1.0" encoding="utf-8"?>
+<p:notes xmlns:a="http://schemas.openxmlformats.org/drawingml/2006/main" xmlns:r="http://schemas.openxmlformats.org/officeDocument/2006/relationships" xmlns:p="http://schemas.openxmlformats.org/presentationml/2006/main">
+  <p:cSld>
+    <p:spTree>
+      <p:nvGrpSpPr>
+        <p:cNvPr id="1" name=""/>
+        <p:cNvGrpSpPr/>
+        <p:nvPr/>
+      </p:nvGrpSpPr>
+      <p:grpSpPr>
+        <a:xfrm>
+          <a:off x="0" y="0"/>
+          <a:ext cx="0" cy="0"/>
+          <a:chOff x="0" y="0"/>
+          <a:chExt cx="0" cy="0"/>
+        </a:xfrm>
+      </p:grpSpPr>
+      <p:sp>
+        <p:nvSpPr>
+          <p:cNvPr id="2" name="Slide Image Placeholder 1"/>
+          <p:cNvSpPr>
+            <a:spLocks noGrp="1" noRot="1" noChangeAspect="1"/>
+          </p:cNvSpPr>
+          <p:nvPr>
+            <p:ph type="sldImg"/>
+          </p:nvPr>
+        </p:nvSpPr>
+        <p:spPr/>
+      </p:sp>
+      <p:sp>
+        <p:nvSpPr>
+          <p:cNvPr id="3" name="Notes Placeholder 2"/>
+          <p:cNvSpPr>
+            <a:spLocks noGrp="1"/>
+          </p:cNvSpPr>
+          <p:nvPr>
+            <p:ph type="body" idx="1"/>
+          </p:nvPr>
+        </p:nvSpPr>
+        <p:spPr/>
+        <p:txBody>
+          <a:bodyPr/>
+          <a:lstStyle/>
+          <a:p>
+            <a:endParaRPr lang="en-US"/>
+          </a:p>
+        </p:txBody>
+      </p:sp>
+      <p:sp>
+        <p:nvSpPr>
+          <p:cNvPr id="4" name="Slide Number Placeholder 3"/>
+          <p:cNvSpPr>
+            <a:spLocks noGrp="1"/>
+          </p:cNvSpPr>
+          <p:nvPr>
+            <p:ph type="sldNum" sz="quarter" idx="10"/>
+          </p:nvPr>
+        </p:nvSpPr>
+        <p:spPr/>
+        <p:txBody>
+          <a:bodyPr/>
+          <a:lstStyle/>
+          <a:p>
+            <a:fld id="{FF2FE42E-3319-E94E-B451-3D3090BF2088}" type="slidenum">
+              <a:rPr lang="en-US" smtClean="0"/>
+              <a:t>21</a:t>
             </a:fld>
             <a:endParaRPr lang="en-US"/>
           </a:p>
@@ -1215,7 +1301,7 @@
           <a:p>
             <a:fld id="{FF2FE42E-3319-E94E-B451-3D3090BF2088}" type="slidenum">
               <a:rPr lang="en-US" smtClean="0"/>
-              <a:t>3</a:t>
+              <a:t>4</a:t>
             </a:fld>
             <a:endParaRPr lang="en-US"/>
           </a:p>
@@ -1299,7 +1385,7 @@
           <a:p>
             <a:fld id="{FF2FE42E-3319-E94E-B451-3D3090BF2088}" type="slidenum">
               <a:rPr lang="en-US" smtClean="0"/>
-              <a:t>4</a:t>
+              <a:t>5</a:t>
             </a:fld>
             <a:endParaRPr lang="en-US"/>
           </a:p>
@@ -1383,7 +1469,7 @@
           <a:p>
             <a:fld id="{FF2FE42E-3319-E94E-B451-3D3090BF2088}" type="slidenum">
               <a:rPr lang="en-US" smtClean="0"/>
-              <a:t>5</a:t>
+              <a:t>6</a:t>
             </a:fld>
             <a:endParaRPr lang="en-US"/>
           </a:p>
@@ -1467,7 +1553,7 @@
           <a:p>
             <a:fld id="{FF2FE42E-3319-E94E-B451-3D3090BF2088}" type="slidenum">
               <a:rPr lang="en-US" smtClean="0"/>
-              <a:t>6</a:t>
+              <a:t>7</a:t>
             </a:fld>
             <a:endParaRPr lang="en-US"/>
           </a:p>
@@ -1551,7 +1637,7 @@
           <a:p>
             <a:fld id="{FF2FE42E-3319-E94E-B451-3D3090BF2088}" type="slidenum">
               <a:rPr lang="en-US" smtClean="0"/>
-              <a:t>7</a:t>
+              <a:t>8</a:t>
             </a:fld>
             <a:endParaRPr lang="en-US"/>
           </a:p>
@@ -1635,7 +1721,7 @@
           <a:p>
             <a:fld id="{FF2FE42E-3319-E94E-B451-3D3090BF2088}" type="slidenum">
               <a:rPr lang="en-US" smtClean="0"/>
-              <a:t>8</a:t>
+              <a:t>9</a:t>
             </a:fld>
             <a:endParaRPr lang="en-US"/>
           </a:p>
@@ -1719,7 +1805,7 @@
           <a:p>
             <a:fld id="{FF2FE42E-3319-E94E-B451-3D3090BF2088}" type="slidenum">
               <a:rPr lang="en-US" smtClean="0"/>
-              <a:t>11</a:t>
+              <a:t>12</a:t>
             </a:fld>
             <a:endParaRPr lang="en-US"/>
           </a:p>
@@ -1803,7 +1889,7 @@
           <a:p>
             <a:fld id="{FF2FE42E-3319-E94E-B451-3D3090BF2088}" type="slidenum">
               <a:rPr lang="en-US" smtClean="0"/>
-              <a:t>12</a:t>
+              <a:t>13</a:t>
             </a:fld>
             <a:endParaRPr lang="en-US"/>
           </a:p>
@@ -5389,6 +5475,93 @@
       </p:sp>
       <p:pic>
         <p:nvPicPr>
+          <p:cNvPr id="9" name="Content Placeholder 8"/>
+          <p:cNvPicPr>
+            <a:picLocks noGrp="1" noChangeAspect="1"/>
+          </p:cNvPicPr>
+          <p:nvPr>
+            <p:ph idx="1"/>
+          </p:nvPr>
+        </p:nvPicPr>
+        <p:blipFill>
+          <a:blip r:embed="rId2"/>
+          <a:srcRect t="5043" b="5043"/>
+          <a:stretch>
+            <a:fillRect/>
+          </a:stretch>
+        </p:blipFill>
+        <p:spPr>
+          <a:xfrm>
+            <a:off x="576782" y="773992"/>
+            <a:ext cx="7543800" cy="3886200"/>
+          </a:xfrm>
+        </p:spPr>
+      </p:pic>
+    </p:spTree>
+    <p:extLst>
+      <p:ext uri="{BB962C8B-B14F-4D97-AF65-F5344CB8AC3E}">
+        <p14:creationId xmlns:p14="http://schemas.microsoft.com/office/powerpoint/2010/main" val="4164729179"/>
+      </p:ext>
+    </p:extLst>
+  </p:cSld>
+  <p:clrMapOvr>
+    <a:masterClrMapping/>
+  </p:clrMapOvr>
+</p:sld>
+</file>
+
+<file path=ppt/slides/slide11.xml><?xml version="1.0" encoding="utf-8"?>
+<p:sld xmlns:a="http://schemas.openxmlformats.org/drawingml/2006/main" xmlns:r="http://schemas.openxmlformats.org/officeDocument/2006/relationships" xmlns:p="http://schemas.openxmlformats.org/presentationml/2006/main">
+  <p:cSld>
+    <p:spTree>
+      <p:nvGrpSpPr>
+        <p:cNvPr id="1" name=""/>
+        <p:cNvGrpSpPr/>
+        <p:nvPr/>
+      </p:nvGrpSpPr>
+      <p:grpSpPr>
+        <a:xfrm>
+          <a:off x="0" y="0"/>
+          <a:ext cx="0" cy="0"/>
+          <a:chOff x="0" y="0"/>
+          <a:chExt cx="0" cy="0"/>
+        </a:xfrm>
+      </p:grpSpPr>
+      <p:sp>
+        <p:nvSpPr>
+          <p:cNvPr id="2" name="Title 1"/>
+          <p:cNvSpPr>
+            <a:spLocks noGrp="1"/>
+          </p:cNvSpPr>
+          <p:nvPr>
+            <p:ph type="title"/>
+          </p:nvPr>
+        </p:nvSpPr>
+        <p:spPr/>
+        <p:txBody>
+          <a:bodyPr>
+            <a:normAutofit fontScale="90000"/>
+          </a:bodyPr>
+          <a:lstStyle/>
+          <a:p>
+            <a:r>
+              <a:rPr lang="en-US" dirty="0" smtClean="0"/>
+              <a:t>Example Problem: </a:t>
+            </a:r>
+            <a:r>
+              <a:rPr lang="en-US" dirty="0" err="1" smtClean="0"/>
+              <a:t>Github</a:t>
+            </a:r>
+            <a:r>
+              <a:rPr lang="en-US" dirty="0" smtClean="0"/>
+              <a:t> API</a:t>
+            </a:r>
+            <a:endParaRPr lang="en-US" dirty="0"/>
+          </a:p>
+        </p:txBody>
+      </p:sp>
+      <p:pic>
+        <p:nvPicPr>
           <p:cNvPr id="8" name="Picture 7" descr="localhost_9000___.png"/>
           <p:cNvPicPr>
             <a:picLocks noChangeAspect="1"/>
@@ -5430,7 +5603,7 @@
 </p:sld>
 </file>
 
-<file path=ppt/slides/slide11.xml><?xml version="1.0" encoding="utf-8"?>
+<file path=ppt/slides/slide12.xml><?xml version="1.0" encoding="utf-8"?>
 <p:sld xmlns:a="http://schemas.openxmlformats.org/drawingml/2006/main" xmlns:r="http://schemas.openxmlformats.org/officeDocument/2006/relationships" xmlns:p="http://schemas.openxmlformats.org/presentationml/2006/main">
   <p:cSld>
     <p:spTree>
@@ -5681,7 +5854,7 @@
 </p:sld>
 </file>
 
-<file path=ppt/slides/slide12.xml><?xml version="1.0" encoding="utf-8"?>
+<file path=ppt/slides/slide13.xml><?xml version="1.0" encoding="utf-8"?>
 <p:sld xmlns:a="http://schemas.openxmlformats.org/drawingml/2006/main" xmlns:r="http://schemas.openxmlformats.org/officeDocument/2006/relationships" xmlns:p="http://schemas.openxmlformats.org/presentationml/2006/main">
   <p:cSld>
     <p:spTree>
@@ -5946,269 +6119,6 @@
 </p:sld>
 </file>
 
-<file path=ppt/slides/slide13.xml><?xml version="1.0" encoding="utf-8"?>
-<p:sld xmlns:a="http://schemas.openxmlformats.org/drawingml/2006/main" xmlns:r="http://schemas.openxmlformats.org/officeDocument/2006/relationships" xmlns:p="http://schemas.openxmlformats.org/presentationml/2006/main">
-  <p:cSld>
-    <p:spTree>
-      <p:nvGrpSpPr>
-        <p:cNvPr id="1" name=""/>
-        <p:cNvGrpSpPr/>
-        <p:nvPr/>
-      </p:nvGrpSpPr>
-      <p:grpSpPr>
-        <a:xfrm>
-          <a:off x="0" y="0"/>
-          <a:ext cx="0" cy="0"/>
-          <a:chOff x="0" y="0"/>
-          <a:chExt cx="0" cy="0"/>
-        </a:xfrm>
-      </p:grpSpPr>
-      <p:sp>
-        <p:nvSpPr>
-          <p:cNvPr id="2" name="Title 1"/>
-          <p:cNvSpPr>
-            <a:spLocks noGrp="1"/>
-          </p:cNvSpPr>
-          <p:nvPr>
-            <p:ph type="title"/>
-          </p:nvPr>
-        </p:nvSpPr>
-        <p:spPr/>
-        <p:txBody>
-          <a:bodyPr/>
-          <a:lstStyle/>
-          <a:p>
-            <a:r>
-              <a:rPr lang="en-US" dirty="0" smtClean="0"/>
-              <a:t>View the markup</a:t>
-            </a:r>
-            <a:endParaRPr lang="en-US" dirty="0"/>
-          </a:p>
-        </p:txBody>
-      </p:sp>
-      <p:sp>
-        <p:nvSpPr>
-          <p:cNvPr id="3" name="Content Placeholder 2"/>
-          <p:cNvSpPr>
-            <a:spLocks noGrp="1"/>
-          </p:cNvSpPr>
-          <p:nvPr>
-            <p:ph idx="1"/>
-          </p:nvPr>
-        </p:nvSpPr>
-        <p:spPr>
-          <a:xfrm>
-            <a:off x="414533" y="685800"/>
-            <a:ext cx="8290677" cy="3886200"/>
-          </a:xfrm>
-        </p:spPr>
-        <p:txBody>
-          <a:bodyPr/>
-          <a:lstStyle/>
-          <a:p>
-            <a:pPr marL="0" indent="0">
-              <a:buNone/>
-            </a:pPr>
-            <a:r>
-              <a:rPr lang="en-US" dirty="0">
-                <a:latin typeface="Courier New"/>
-                <a:cs typeface="Courier New"/>
-              </a:rPr>
-              <a:t>&lt;div class="well"&gt;</a:t>
-            </a:r>
-          </a:p>
-          <a:p>
-            <a:pPr marL="0" indent="0">
-              <a:buNone/>
-            </a:pPr>
-            <a:r>
-              <a:rPr lang="en-US" dirty="0">
-                <a:latin typeface="Courier New"/>
-                <a:cs typeface="Courier New"/>
-              </a:rPr>
-              <a:t>    &lt;h3&gt;Angular </a:t>
-            </a:r>
-            <a:r>
-              <a:rPr lang="en-US" dirty="0" err="1">
-                <a:latin typeface="Courier New"/>
-                <a:cs typeface="Courier New"/>
-              </a:rPr>
-              <a:t>Github</a:t>
-            </a:r>
-            <a:r>
-              <a:rPr lang="en-US" dirty="0">
-                <a:latin typeface="Courier New"/>
-                <a:cs typeface="Courier New"/>
-              </a:rPr>
-              <a:t> Repo Content&lt;/h3&gt;</a:t>
-            </a:r>
-          </a:p>
-          <a:p>
-            <a:pPr marL="0" indent="0">
-              <a:buNone/>
-            </a:pPr>
-            <a:r>
-              <a:rPr lang="en-US" dirty="0">
-                <a:latin typeface="Courier New"/>
-                <a:cs typeface="Courier New"/>
-              </a:rPr>
-              <a:t>    &lt;p&gt;{{</a:t>
-            </a:r>
-            <a:r>
-              <a:rPr lang="en-US" dirty="0" err="1">
-                <a:latin typeface="Courier New"/>
-                <a:cs typeface="Courier New"/>
-              </a:rPr>
-              <a:t>repoChanges</a:t>
-            </a:r>
-            <a:r>
-              <a:rPr lang="en-US" dirty="0">
-                <a:latin typeface="Courier New"/>
-                <a:cs typeface="Courier New"/>
-              </a:rPr>
-              <a:t>}} total changes&lt;/p&gt;</a:t>
-            </a:r>
-          </a:p>
-          <a:p>
-            <a:pPr marL="0" indent="0">
-              <a:buNone/>
-            </a:pPr>
-            <a:r>
-              <a:rPr lang="en-US" dirty="0">
-                <a:latin typeface="Courier New"/>
-                <a:cs typeface="Courier New"/>
-              </a:rPr>
-              <a:t>    &lt;</a:t>
-            </a:r>
-            <a:r>
-              <a:rPr lang="en-US" b="1" dirty="0" err="1">
-                <a:latin typeface="Courier New"/>
-                <a:cs typeface="Courier New"/>
-              </a:rPr>
-              <a:t>github</a:t>
-            </a:r>
-            <a:r>
-              <a:rPr lang="en-US" b="1" dirty="0">
-                <a:latin typeface="Courier New"/>
-                <a:cs typeface="Courier New"/>
-              </a:rPr>
-              <a:t>-repo-view </a:t>
-            </a:r>
-            <a:endParaRPr lang="en-US" b="1" dirty="0" smtClean="0">
-              <a:latin typeface="Courier New"/>
-              <a:cs typeface="Courier New"/>
-            </a:endParaRPr>
-          </a:p>
-          <a:p>
-            <a:pPr marL="0" indent="0">
-              <a:buNone/>
-            </a:pPr>
-            <a:r>
-              <a:rPr lang="en-US" dirty="0">
-                <a:latin typeface="Courier New"/>
-                <a:cs typeface="Courier New"/>
-              </a:rPr>
-              <a:t> </a:t>
-            </a:r>
-            <a:r>
-              <a:rPr lang="en-US" dirty="0" smtClean="0">
-                <a:latin typeface="Courier New"/>
-                <a:cs typeface="Courier New"/>
-              </a:rPr>
-              <a:t>         action</a:t>
-            </a:r>
-            <a:r>
-              <a:rPr lang="en-US" dirty="0">
-                <a:latin typeface="Courier New"/>
-                <a:cs typeface="Courier New"/>
-              </a:rPr>
-              <a:t>="</a:t>
-            </a:r>
-            <a:r>
-              <a:rPr lang="en-US" dirty="0" err="1" smtClean="0">
-                <a:latin typeface="Courier New"/>
-                <a:cs typeface="Courier New"/>
-              </a:rPr>
-              <a:t>viewContent</a:t>
-            </a:r>
-            <a:r>
-              <a:rPr lang="en-US" dirty="0" smtClean="0">
-                <a:latin typeface="Courier New"/>
-                <a:cs typeface="Courier New"/>
-              </a:rPr>
-              <a:t>”</a:t>
-            </a:r>
-          </a:p>
-          <a:p>
-            <a:pPr marL="0" indent="0">
-              <a:buNone/>
-            </a:pPr>
-            <a:r>
-              <a:rPr lang="en-US" dirty="0" smtClean="0">
-                <a:latin typeface="Courier New"/>
-                <a:cs typeface="Courier New"/>
-              </a:rPr>
-              <a:t>          content</a:t>
-            </a:r>
-            <a:r>
-              <a:rPr lang="en-US" dirty="0">
-                <a:latin typeface="Courier New"/>
-                <a:cs typeface="Courier New"/>
-              </a:rPr>
-              <a:t>="</a:t>
-            </a:r>
-            <a:r>
-              <a:rPr lang="en-US" dirty="0" err="1">
-                <a:latin typeface="Courier New"/>
-                <a:cs typeface="Courier New"/>
-              </a:rPr>
-              <a:t>repoContent</a:t>
-            </a:r>
-            <a:r>
-              <a:rPr lang="en-US" dirty="0">
-                <a:latin typeface="Courier New"/>
-                <a:cs typeface="Courier New"/>
-              </a:rPr>
-              <a:t>"/&gt;</a:t>
-            </a:r>
-          </a:p>
-          <a:p>
-            <a:pPr marL="0" indent="0">
-              <a:buNone/>
-            </a:pPr>
-            <a:r>
-              <a:rPr lang="en-US" dirty="0">
-                <a:latin typeface="Courier New"/>
-                <a:cs typeface="Courier New"/>
-              </a:rPr>
-              <a:t>&lt;/div&gt;</a:t>
-            </a:r>
-          </a:p>
-          <a:p>
-            <a:endParaRPr lang="en-US" dirty="0"/>
-          </a:p>
-        </p:txBody>
-      </p:sp>
-    </p:spTree>
-    <p:extLst>
-      <p:ext uri="{BB962C8B-B14F-4D97-AF65-F5344CB8AC3E}">
-        <p14:creationId xmlns:p14="http://schemas.microsoft.com/office/powerpoint/2010/main" val="388477001"/>
-      </p:ext>
-    </p:extLst>
-  </p:cSld>
-  <p:clrMapOvr>
-    <a:masterClrMapping/>
-  </p:clrMapOvr>
-  <p:timing>
-    <p:tnLst>
-      <p:par>
-        <p:cTn xmlns:p14="http://schemas.microsoft.com/office/powerpoint/2010/main" id="1" dur="indefinite" restart="never" nodeType="tmRoot"/>
-      </p:par>
-    </p:tnLst>
-  </p:timing>
-</p:sld>
-</file>
-
 <file path=ppt/slides/slide14.xml><?xml version="1.0" encoding="utf-8"?>
 <p:sld xmlns:a="http://schemas.openxmlformats.org/drawingml/2006/main" xmlns:r="http://schemas.openxmlformats.org/officeDocument/2006/relationships" xmlns:p="http://schemas.openxmlformats.org/presentationml/2006/main">
   <p:cSld>
@@ -6243,7 +6153,7 @@
           <a:p>
             <a:r>
               <a:rPr lang="en-US" dirty="0" smtClean="0"/>
-              <a:t>Testing the Controller</a:t>
+              <a:t>View the markup</a:t>
             </a:r>
             <a:endParaRPr lang="en-US" dirty="0"/>
           </a:p>
@@ -6273,45 +6183,181 @@
               <a:buNone/>
             </a:pPr>
             <a:r>
-              <a:rPr lang="en-US" b="1" u="sng" dirty="0" smtClean="0"/>
-              <a:t>Responsibilities</a:t>
-            </a:r>
-          </a:p>
-          <a:p>
-            <a:r>
-              <a:rPr lang="en-US" dirty="0" smtClean="0"/>
-              <a:t>Load content from services</a:t>
-            </a:r>
-          </a:p>
-          <a:p>
-            <a:r>
-              <a:rPr lang="en-US" dirty="0" smtClean="0"/>
-              <a:t>Handle event when </a:t>
-            </a:r>
-            <a:r>
-              <a:rPr lang="en-US" dirty="0" err="1" smtClean="0"/>
-              <a:t>dir</a:t>
-            </a:r>
-            <a:r>
-              <a:rPr lang="en-US" dirty="0" smtClean="0"/>
-              <a:t> is clicked to load contents for dir</a:t>
-            </a:r>
-            <a:r>
-              <a:rPr lang="en-US" dirty="0" smtClean="0"/>
-              <a:t>.</a:t>
-            </a:r>
-          </a:p>
-          <a:p>
-            <a:r>
-              <a:rPr lang="en-US" dirty="0" smtClean="0"/>
-              <a:t>Setup refresh</a:t>
-            </a:r>
-          </a:p>
-          <a:p>
-            <a:r>
-              <a:rPr lang="en-US" dirty="0" smtClean="0"/>
-              <a:t>Count refreshes</a:t>
-            </a:r>
+              <a:rPr lang="en-US" dirty="0">
+                <a:latin typeface="Courier New"/>
+                <a:cs typeface="Courier New"/>
+              </a:rPr>
+              <a:t>&lt;div class="well"&gt;</a:t>
+            </a:r>
+          </a:p>
+          <a:p>
+            <a:pPr marL="0" indent="0">
+              <a:buNone/>
+            </a:pPr>
+            <a:r>
+              <a:rPr lang="en-US" dirty="0">
+                <a:latin typeface="Courier New"/>
+                <a:cs typeface="Courier New"/>
+              </a:rPr>
+              <a:t>    &lt;h3&gt;Angular </a:t>
+            </a:r>
+            <a:r>
+              <a:rPr lang="en-US" dirty="0" err="1">
+                <a:latin typeface="Courier New"/>
+                <a:cs typeface="Courier New"/>
+              </a:rPr>
+              <a:t>Github</a:t>
+            </a:r>
+            <a:r>
+              <a:rPr lang="en-US" dirty="0">
+                <a:latin typeface="Courier New"/>
+                <a:cs typeface="Courier New"/>
+              </a:rPr>
+              <a:t> Repo Content&lt;/h3&gt;</a:t>
+            </a:r>
+          </a:p>
+          <a:p>
+            <a:pPr marL="0" indent="0">
+              <a:buNone/>
+            </a:pPr>
+            <a:r>
+              <a:rPr lang="en-US" dirty="0">
+                <a:latin typeface="Courier New"/>
+                <a:cs typeface="Courier New"/>
+              </a:rPr>
+              <a:t>    &lt;p&gt;{{</a:t>
+            </a:r>
+            <a:r>
+              <a:rPr lang="en-US" dirty="0" err="1">
+                <a:latin typeface="Courier New"/>
+                <a:cs typeface="Courier New"/>
+              </a:rPr>
+              <a:t>repoChanges</a:t>
+            </a:r>
+            <a:r>
+              <a:rPr lang="en-US" dirty="0">
+                <a:latin typeface="Courier New"/>
+                <a:cs typeface="Courier New"/>
+              </a:rPr>
+              <a:t>}} total changes&lt;/p&gt;</a:t>
+            </a:r>
+          </a:p>
+          <a:p>
+            <a:pPr marL="0" indent="0">
+              <a:buNone/>
+            </a:pPr>
+            <a:r>
+              <a:rPr lang="en-US" dirty="0">
+                <a:latin typeface="Courier New"/>
+                <a:cs typeface="Courier New"/>
+              </a:rPr>
+              <a:t>    &lt;</a:t>
+            </a:r>
+            <a:r>
+              <a:rPr lang="en-US" b="1" dirty="0" err="1">
+                <a:latin typeface="Courier New"/>
+                <a:cs typeface="Courier New"/>
+              </a:rPr>
+              <a:t>github</a:t>
+            </a:r>
+            <a:r>
+              <a:rPr lang="en-US" b="1" dirty="0">
+                <a:latin typeface="Courier New"/>
+                <a:cs typeface="Courier New"/>
+              </a:rPr>
+              <a:t>-repo-view </a:t>
+            </a:r>
+            <a:endParaRPr lang="en-US" b="1" dirty="0" smtClean="0">
+              <a:latin typeface="Courier New"/>
+              <a:cs typeface="Courier New"/>
+            </a:endParaRPr>
+          </a:p>
+          <a:p>
+            <a:pPr marL="0" indent="0">
+              <a:buNone/>
+            </a:pPr>
+            <a:r>
+              <a:rPr lang="en-US" dirty="0">
+                <a:latin typeface="Courier New"/>
+                <a:cs typeface="Courier New"/>
+              </a:rPr>
+              <a:t> </a:t>
+            </a:r>
+            <a:r>
+              <a:rPr lang="en-US" dirty="0" smtClean="0">
+                <a:latin typeface="Courier New"/>
+                <a:cs typeface="Courier New"/>
+              </a:rPr>
+              <a:t>         action</a:t>
+            </a:r>
+            <a:r>
+              <a:rPr lang="en-US" dirty="0">
+                <a:latin typeface="Courier New"/>
+                <a:cs typeface="Courier New"/>
+              </a:rPr>
+              <a:t>="</a:t>
+            </a:r>
+            <a:r>
+              <a:rPr lang="en-US" dirty="0" err="1" smtClean="0">
+                <a:latin typeface="Courier New"/>
+                <a:cs typeface="Courier New"/>
+              </a:rPr>
+              <a:t>viewContent</a:t>
+            </a:r>
+            <a:r>
+              <a:rPr lang="en-US" dirty="0" smtClean="0">
+                <a:latin typeface="Courier New"/>
+                <a:cs typeface="Courier New"/>
+              </a:rPr>
+              <a:t>”</a:t>
+            </a:r>
+          </a:p>
+          <a:p>
+            <a:pPr marL="0" indent="0">
+              <a:buNone/>
+            </a:pPr>
+            <a:r>
+              <a:rPr lang="en-US" dirty="0" smtClean="0">
+                <a:latin typeface="Courier New"/>
+                <a:cs typeface="Courier New"/>
+              </a:rPr>
+              <a:t>          content</a:t>
+            </a:r>
+            <a:r>
+              <a:rPr lang="en-US" dirty="0">
+                <a:latin typeface="Courier New"/>
+                <a:cs typeface="Courier New"/>
+              </a:rPr>
+              <a:t>="</a:t>
+            </a:r>
+            <a:r>
+              <a:rPr lang="en-US" dirty="0" err="1">
+                <a:latin typeface="Courier New"/>
+                <a:cs typeface="Courier New"/>
+              </a:rPr>
+              <a:t>repoContent</a:t>
+            </a:r>
+            <a:r>
+              <a:rPr lang="en-US" dirty="0">
+                <a:latin typeface="Courier New"/>
+                <a:cs typeface="Courier New"/>
+              </a:rPr>
+              <a:t>"/&gt;</a:t>
+            </a:r>
+          </a:p>
+          <a:p>
+            <a:pPr marL="0" indent="0">
+              <a:buNone/>
+            </a:pPr>
+            <a:r>
+              <a:rPr lang="en-US" dirty="0">
+                <a:latin typeface="Courier New"/>
+                <a:cs typeface="Courier New"/>
+              </a:rPr>
+              <a:t>&lt;/div&gt;</a:t>
+            </a:r>
+          </a:p>
+          <a:p>
             <a:endParaRPr lang="en-US" dirty="0"/>
           </a:p>
         </p:txBody>
@@ -6319,7 +6365,7 @@
     </p:spTree>
     <p:extLst>
       <p:ext uri="{BB962C8B-B14F-4D97-AF65-F5344CB8AC3E}">
-        <p14:creationId xmlns:p14="http://schemas.microsoft.com/office/powerpoint/2010/main" val="2064058107"/>
+        <p14:creationId xmlns:p14="http://schemas.microsoft.com/office/powerpoint/2010/main" val="388477001"/>
       </p:ext>
     </p:extLst>
   </p:cSld>
@@ -6401,44 +6447,52 @@
             </a:pPr>
             <a:r>
               <a:rPr lang="en-US" b="1" u="sng" dirty="0" smtClean="0"/>
-              <a:t>Tactics</a:t>
-            </a:r>
-            <a:endParaRPr lang="en-US" b="1" u="sng" dirty="0" smtClean="0"/>
-          </a:p>
-          <a:p>
-            <a:r>
-              <a:rPr lang="en-US" dirty="0" smtClean="0"/>
-              <a:t>Mock </a:t>
+              <a:t>Responsibilities</a:t>
+            </a:r>
+          </a:p>
+          <a:p>
+            <a:r>
+              <a:rPr lang="en-US" dirty="0" smtClean="0"/>
+              <a:t>Load content from services</a:t>
+            </a:r>
+          </a:p>
+          <a:p>
+            <a:r>
+              <a:rPr lang="en-US" dirty="0" smtClean="0"/>
+              <a:t>Handle event when </a:t>
             </a:r>
             <a:r>
               <a:rPr lang="en-US" dirty="0" err="1" smtClean="0"/>
-              <a:t>angularRepo</a:t>
-            </a:r>
-            <a:r>
-              <a:rPr lang="en-US" dirty="0" smtClean="0"/>
-              <a:t> service</a:t>
-            </a:r>
-            <a:endParaRPr lang="en-US" dirty="0" smtClean="0"/>
-          </a:p>
-          <a:p>
-            <a:r>
-              <a:rPr lang="en-US" dirty="0" smtClean="0"/>
-              <a:t>Inject scope &amp; mock via $controller()</a:t>
-            </a:r>
-          </a:p>
-          <a:p>
-            <a:r>
-              <a:rPr lang="en-US" dirty="0" smtClean="0"/>
-              <a:t>Use $apply() to test watches</a:t>
-            </a:r>
-            <a:endParaRPr lang="en-US" dirty="0" smtClean="0"/>
+              <a:t>dir</a:t>
+            </a:r>
+            <a:r>
+              <a:rPr lang="en-US" dirty="0" smtClean="0"/>
+              <a:t> is clicked to load contents for dir</a:t>
+            </a:r>
+            <a:r>
+              <a:rPr lang="en-US" dirty="0" smtClean="0"/>
+              <a:t>.</a:t>
+            </a:r>
+          </a:p>
+          <a:p>
+            <a:r>
+              <a:rPr lang="en-US" dirty="0" smtClean="0"/>
+              <a:t>Setup refresh</a:t>
+            </a:r>
+          </a:p>
+          <a:p>
+            <a:r>
+              <a:rPr lang="en-US" dirty="0" smtClean="0"/>
+              <a:t>Count refreshes</a:t>
+            </a:r>
+            <a:endParaRPr lang="en-US" dirty="0"/>
           </a:p>
         </p:txBody>
       </p:sp>
     </p:spTree>
     <p:extLst>
       <p:ext uri="{BB962C8B-B14F-4D97-AF65-F5344CB8AC3E}">
-        <p14:creationId xmlns:p14="http://schemas.microsoft.com/office/powerpoint/2010/main" val="1570473771"/>
+        <p14:creationId xmlns:p14="http://schemas.microsoft.com/office/powerpoint/2010/main" val="2064058107"/>
       </p:ext>
     </p:extLst>
   </p:cSld>
@@ -6489,7 +6543,7 @@
           <a:p>
             <a:r>
               <a:rPr lang="en-US" dirty="0" smtClean="0"/>
-              <a:t>Testing the Service</a:t>
+              <a:t>Testing the Controller</a:t>
             </a:r>
             <a:endParaRPr lang="en-US" dirty="0"/>
           </a:p>
@@ -6520,26 +6574,35 @@
             </a:pPr>
             <a:r>
               <a:rPr lang="en-US" b="1" u="sng" dirty="0" smtClean="0"/>
-              <a:t>Responsibilities</a:t>
+              <a:t>Tactics</a:t>
             </a:r>
             <a:endParaRPr lang="en-US" b="1" u="sng" dirty="0" smtClean="0"/>
           </a:p>
           <a:p>
             <a:r>
               <a:rPr lang="en-US" dirty="0" smtClean="0"/>
-              <a:t>HTTP interface</a:t>
-            </a:r>
-          </a:p>
-          <a:p>
-            <a:r>
-              <a:rPr lang="en-US" dirty="0" smtClean="0"/>
-              <a:t>Object model – Item</a:t>
-            </a:r>
-          </a:p>
-          <a:p>
-            <a:r>
-              <a:rPr lang="en-US" dirty="0" smtClean="0"/>
-              <a:t>refresh</a:t>
+              <a:t>Mock </a:t>
+            </a:r>
+            <a:r>
+              <a:rPr lang="en-US" dirty="0" err="1" smtClean="0"/>
+              <a:t>angularRepo</a:t>
+            </a:r>
+            <a:r>
+              <a:rPr lang="en-US" dirty="0" smtClean="0"/>
+              <a:t> service</a:t>
+            </a:r>
+            <a:endParaRPr lang="en-US" dirty="0" smtClean="0"/>
+          </a:p>
+          <a:p>
+            <a:r>
+              <a:rPr lang="en-US" dirty="0" smtClean="0"/>
+              <a:t>Inject scope &amp; mock via $controller()</a:t>
+            </a:r>
+          </a:p>
+          <a:p>
+            <a:r>
+              <a:rPr lang="en-US" dirty="0" smtClean="0"/>
+              <a:t>Use $apply() to test watches</a:t>
             </a:r>
             <a:endParaRPr lang="en-US" dirty="0" smtClean="0"/>
           </a:p>
@@ -6548,7 +6611,7 @@
     </p:spTree>
     <p:extLst>
       <p:ext uri="{BB962C8B-B14F-4D97-AF65-F5344CB8AC3E}">
-        <p14:creationId xmlns:p14="http://schemas.microsoft.com/office/powerpoint/2010/main" val="1946384567"/>
+        <p14:creationId xmlns:p14="http://schemas.microsoft.com/office/powerpoint/2010/main" val="1570473771"/>
       </p:ext>
     </p:extLst>
   </p:cSld>
@@ -6630,28 +6693,26 @@
             </a:pPr>
             <a:r>
               <a:rPr lang="en-US" b="1" u="sng" dirty="0" smtClean="0"/>
-              <a:t>Tactics</a:t>
+              <a:t>Responsibilities</a:t>
             </a:r>
             <a:endParaRPr lang="en-US" b="1" u="sng" dirty="0" smtClean="0"/>
           </a:p>
           <a:p>
             <a:r>
               <a:rPr lang="en-US" dirty="0" smtClean="0"/>
-              <a:t>module/$provide to mock $</a:t>
-            </a:r>
-            <a:r>
-              <a:rPr lang="en-US" dirty="0" smtClean="0"/>
-              <a:t>timeout service</a:t>
-            </a:r>
-          </a:p>
-          <a:p>
-            <a:r>
-              <a:rPr lang="en-US" dirty="0" smtClean="0"/>
-              <a:t>inject to acquire </a:t>
-            </a:r>
-            <a:r>
-              <a:rPr lang="en-US" dirty="0" err="1" smtClean="0"/>
-              <a:t>httpBackend</a:t>
+              <a:t>HTTP interface</a:t>
+            </a:r>
+          </a:p>
+          <a:p>
+            <a:r>
+              <a:rPr lang="en-US" dirty="0" smtClean="0"/>
+              <a:t>Object model – Item</a:t>
+            </a:r>
+          </a:p>
+          <a:p>
+            <a:r>
+              <a:rPr lang="en-US" dirty="0" smtClean="0"/>
+              <a:t>refresh</a:t>
             </a:r>
             <a:endParaRPr lang="en-US" dirty="0" smtClean="0"/>
           </a:p>
@@ -6660,7 +6721,7 @@
     </p:spTree>
     <p:extLst>
       <p:ext uri="{BB962C8B-B14F-4D97-AF65-F5344CB8AC3E}">
-        <p14:creationId xmlns:p14="http://schemas.microsoft.com/office/powerpoint/2010/main" val="1476911031"/>
+        <p14:creationId xmlns:p14="http://schemas.microsoft.com/office/powerpoint/2010/main" val="1946384567"/>
       </p:ext>
     </p:extLst>
   </p:cSld>
@@ -6711,7 +6772,7 @@
           <a:p>
             <a:r>
               <a:rPr lang="en-US" dirty="0" smtClean="0"/>
-              <a:t>Testing the Directive</a:t>
+              <a:t>Testing the Service</a:t>
             </a:r>
             <a:endParaRPr lang="en-US" dirty="0"/>
           </a:p>
@@ -6742,42 +6803,28 @@
             </a:pPr>
             <a:r>
               <a:rPr lang="en-US" b="1" u="sng" dirty="0" smtClean="0"/>
-              <a:t>Responsibilities</a:t>
+              <a:t>Tactics</a:t>
             </a:r>
             <a:endParaRPr lang="en-US" b="1" u="sng" dirty="0" smtClean="0"/>
           </a:p>
           <a:p>
             <a:r>
               <a:rPr lang="en-US" dirty="0" smtClean="0"/>
-              <a:t>Table of items</a:t>
-            </a:r>
-          </a:p>
-          <a:p>
-            <a:r>
-              <a:rPr lang="en-US" dirty="0" smtClean="0"/>
-              <a:t>Anchor/</a:t>
+              <a:t>module/$provide to mock $</a:t>
+            </a:r>
+            <a:r>
+              <a:rPr lang="en-US" dirty="0" smtClean="0"/>
+              <a:t>timeout service</a:t>
+            </a:r>
+          </a:p>
+          <a:p>
+            <a:r>
+              <a:rPr lang="en-US" dirty="0" smtClean="0"/>
+              <a:t>inject to acquire </a:t>
             </a:r>
             <a:r>
               <a:rPr lang="en-US" dirty="0" err="1" smtClean="0"/>
-              <a:t>onClick</a:t>
-            </a:r>
-            <a:r>
-              <a:rPr lang="en-US" dirty="0" smtClean="0"/>
-              <a:t> for </a:t>
-            </a:r>
-            <a:r>
-              <a:rPr lang="en-US" dirty="0" err="1" smtClean="0"/>
-              <a:t>dir</a:t>
-            </a:r>
-            <a:r>
-              <a:rPr lang="en-US" dirty="0" smtClean="0"/>
-              <a:t> type items</a:t>
-            </a:r>
-          </a:p>
-          <a:p>
-            <a:r>
-              <a:rPr lang="en-US" dirty="0" smtClean="0"/>
-              <a:t>content &amp; action properties to link to controller</a:t>
+              <a:t>httpBackend</a:t>
             </a:r>
             <a:endParaRPr lang="en-US" dirty="0" smtClean="0"/>
           </a:p>
@@ -6786,7 +6833,7 @@
     </p:spTree>
     <p:extLst>
       <p:ext uri="{BB962C8B-B14F-4D97-AF65-F5344CB8AC3E}">
-        <p14:creationId xmlns:p14="http://schemas.microsoft.com/office/powerpoint/2010/main" val="2107531807"/>
+        <p14:creationId xmlns:p14="http://schemas.microsoft.com/office/powerpoint/2010/main" val="1476911031"/>
       </p:ext>
     </p:extLst>
   </p:cSld>
@@ -6868,27 +6915,43 @@
             </a:pPr>
             <a:r>
               <a:rPr lang="en-US" b="1" u="sng" dirty="0" smtClean="0"/>
-              <a:t>Tactics</a:t>
+              <a:t>Responsibilities</a:t>
             </a:r>
             <a:endParaRPr lang="en-US" b="1" u="sng" dirty="0" smtClean="0"/>
           </a:p>
           <a:p>
             <a:r>
               <a:rPr lang="en-US" dirty="0" smtClean="0"/>
-              <a:t>$compile/$digest to build the DOM element</a:t>
-            </a:r>
-          </a:p>
-          <a:p>
-            <a:r>
-              <a:rPr lang="en-US" dirty="0" smtClean="0"/>
-              <a:t>Selectors to locate items in DOM </a:t>
-            </a:r>
-            <a:r>
-              <a:rPr lang="en-US" smtClean="0"/>
-              <a:t>to test</a:t>
-            </a:r>
-          </a:p>
-          <a:p>
+              <a:t>Table of items</a:t>
+            </a:r>
+          </a:p>
+          <a:p>
+            <a:r>
+              <a:rPr lang="en-US" dirty="0" smtClean="0"/>
+              <a:t>Anchor/</a:t>
+            </a:r>
+            <a:r>
+              <a:rPr lang="en-US" dirty="0" err="1" smtClean="0"/>
+              <a:t>onClick</a:t>
+            </a:r>
+            <a:r>
+              <a:rPr lang="en-US" dirty="0" smtClean="0"/>
+              <a:t> for </a:t>
+            </a:r>
+            <a:r>
+              <a:rPr lang="en-US" dirty="0" err="1" smtClean="0"/>
+              <a:t>dir</a:t>
+            </a:r>
+            <a:r>
+              <a:rPr lang="en-US" dirty="0" smtClean="0"/>
+              <a:t> type items</a:t>
+            </a:r>
+          </a:p>
+          <a:p>
+            <a:r>
+              <a:rPr lang="en-US" dirty="0" smtClean="0"/>
+              <a:t>content &amp; action properties to link to controller</a:t>
+            </a:r>
             <a:endParaRPr lang="en-US" dirty="0" smtClean="0"/>
           </a:p>
         </p:txBody>
@@ -6896,7 +6959,7 @@
     </p:spTree>
     <p:extLst>
       <p:ext uri="{BB962C8B-B14F-4D97-AF65-F5344CB8AC3E}">
-        <p14:creationId xmlns:p14="http://schemas.microsoft.com/office/powerpoint/2010/main" val="3335658865"/>
+        <p14:creationId xmlns:p14="http://schemas.microsoft.com/office/powerpoint/2010/main" val="2107531807"/>
       </p:ext>
     </p:extLst>
   </p:cSld>
@@ -7017,8 +7080,19 @@
           <a:p>
             <a:r>
               <a:rPr lang="en-US" dirty="0" smtClean="0"/>
-              <a:t>Recent move to front-end with Angular</a:t>
-            </a:r>
+              <a:t>Recent move to front-end with </a:t>
+            </a:r>
+            <a:r>
+              <a:rPr lang="en-US" dirty="0" smtClean="0"/>
+              <a:t>Angular</a:t>
+            </a:r>
+          </a:p>
+          <a:p>
+            <a:r>
+              <a:rPr lang="en-US" dirty="0" smtClean="0"/>
+              <a:t>Big fan of testing</a:t>
+            </a:r>
+            <a:endParaRPr lang="en-US" dirty="0" smtClean="0"/>
           </a:p>
           <a:p>
             <a:endParaRPr lang="en-US" dirty="0"/>
@@ -7035,6 +7109,206 @@
   <p:clrMapOvr>
     <a:masterClrMapping/>
   </p:clrMapOvr>
+</p:sld>
+</file>
+
+<file path=ppt/slides/slide20.xml><?xml version="1.0" encoding="utf-8"?>
+<p:sld xmlns:a="http://schemas.openxmlformats.org/drawingml/2006/main" xmlns:r="http://schemas.openxmlformats.org/officeDocument/2006/relationships" xmlns:p="http://schemas.openxmlformats.org/presentationml/2006/main">
+  <p:cSld>
+    <p:spTree>
+      <p:nvGrpSpPr>
+        <p:cNvPr id="1" name=""/>
+        <p:cNvGrpSpPr/>
+        <p:nvPr/>
+      </p:nvGrpSpPr>
+      <p:grpSpPr>
+        <a:xfrm>
+          <a:off x="0" y="0"/>
+          <a:ext cx="0" cy="0"/>
+          <a:chOff x="0" y="0"/>
+          <a:chExt cx="0" cy="0"/>
+        </a:xfrm>
+      </p:grpSpPr>
+      <p:sp>
+        <p:nvSpPr>
+          <p:cNvPr id="2" name="Title 1"/>
+          <p:cNvSpPr>
+            <a:spLocks noGrp="1"/>
+          </p:cNvSpPr>
+          <p:nvPr>
+            <p:ph type="title"/>
+          </p:nvPr>
+        </p:nvSpPr>
+        <p:spPr/>
+        <p:txBody>
+          <a:bodyPr/>
+          <a:lstStyle/>
+          <a:p>
+            <a:r>
+              <a:rPr lang="en-US" dirty="0" smtClean="0"/>
+              <a:t>Testing the Directive</a:t>
+            </a:r>
+            <a:endParaRPr lang="en-US" dirty="0"/>
+          </a:p>
+        </p:txBody>
+      </p:sp>
+      <p:sp>
+        <p:nvSpPr>
+          <p:cNvPr id="3" name="Content Placeholder 2"/>
+          <p:cNvSpPr>
+            <a:spLocks noGrp="1"/>
+          </p:cNvSpPr>
+          <p:nvPr>
+            <p:ph idx="1"/>
+          </p:nvPr>
+        </p:nvSpPr>
+        <p:spPr>
+          <a:xfrm>
+            <a:off x="414533" y="685800"/>
+            <a:ext cx="8290677" cy="3886200"/>
+          </a:xfrm>
+        </p:spPr>
+        <p:txBody>
+          <a:bodyPr/>
+          <a:lstStyle/>
+          <a:p>
+            <a:pPr marL="0" indent="0">
+              <a:buNone/>
+            </a:pPr>
+            <a:r>
+              <a:rPr lang="en-US" b="1" u="sng" dirty="0" smtClean="0"/>
+              <a:t>Tactics</a:t>
+            </a:r>
+            <a:endParaRPr lang="en-US" b="1" u="sng" dirty="0" smtClean="0"/>
+          </a:p>
+          <a:p>
+            <a:r>
+              <a:rPr lang="en-US" dirty="0" smtClean="0"/>
+              <a:t>$compile/$digest to build the DOM element</a:t>
+            </a:r>
+          </a:p>
+          <a:p>
+            <a:r>
+              <a:rPr lang="en-US" dirty="0" smtClean="0"/>
+              <a:t>Selectors to locate items in DOM to test</a:t>
+            </a:r>
+          </a:p>
+          <a:p>
+            <a:endParaRPr lang="en-US" dirty="0" smtClean="0"/>
+          </a:p>
+        </p:txBody>
+      </p:sp>
+    </p:spTree>
+    <p:extLst>
+      <p:ext uri="{BB962C8B-B14F-4D97-AF65-F5344CB8AC3E}">
+        <p14:creationId xmlns:p14="http://schemas.microsoft.com/office/powerpoint/2010/main" val="3335658865"/>
+      </p:ext>
+    </p:extLst>
+  </p:cSld>
+  <p:clrMapOvr>
+    <a:masterClrMapping/>
+  </p:clrMapOvr>
+  <p:timing>
+    <p:tnLst>
+      <p:par>
+        <p:cTn xmlns:p14="http://schemas.microsoft.com/office/powerpoint/2010/main" id="1" dur="indefinite" restart="never" nodeType="tmRoot"/>
+      </p:par>
+    </p:tnLst>
+  </p:timing>
+</p:sld>
+</file>
+
+<file path=ppt/slides/slide21.xml><?xml version="1.0" encoding="utf-8"?>
+<p:sld xmlns:a="http://schemas.openxmlformats.org/drawingml/2006/main" xmlns:r="http://schemas.openxmlformats.org/officeDocument/2006/relationships" xmlns:p="http://schemas.openxmlformats.org/presentationml/2006/main">
+  <p:cSld>
+    <p:spTree>
+      <p:nvGrpSpPr>
+        <p:cNvPr id="1" name=""/>
+        <p:cNvGrpSpPr/>
+        <p:nvPr/>
+      </p:nvGrpSpPr>
+      <p:grpSpPr>
+        <a:xfrm>
+          <a:off x="0" y="0"/>
+          <a:ext cx="0" cy="0"/>
+          <a:chOff x="0" y="0"/>
+          <a:chExt cx="0" cy="0"/>
+        </a:xfrm>
+      </p:grpSpPr>
+      <p:sp>
+        <p:nvSpPr>
+          <p:cNvPr id="2" name="Title 1"/>
+          <p:cNvSpPr>
+            <a:spLocks noGrp="1"/>
+          </p:cNvSpPr>
+          <p:nvPr>
+            <p:ph type="title"/>
+          </p:nvPr>
+        </p:nvSpPr>
+        <p:spPr/>
+        <p:txBody>
+          <a:bodyPr/>
+          <a:lstStyle/>
+          <a:p>
+            <a:r>
+              <a:rPr lang="en-US" dirty="0" smtClean="0"/>
+              <a:t>The End</a:t>
+            </a:r>
+            <a:endParaRPr lang="en-US" dirty="0"/>
+          </a:p>
+        </p:txBody>
+      </p:sp>
+      <p:sp>
+        <p:nvSpPr>
+          <p:cNvPr id="3" name="Content Placeholder 2"/>
+          <p:cNvSpPr>
+            <a:spLocks noGrp="1"/>
+          </p:cNvSpPr>
+          <p:nvPr>
+            <p:ph idx="1"/>
+          </p:nvPr>
+        </p:nvSpPr>
+        <p:spPr>
+          <a:xfrm>
+            <a:off x="414533" y="685800"/>
+            <a:ext cx="8290677" cy="3886200"/>
+          </a:xfrm>
+        </p:spPr>
+        <p:txBody>
+          <a:bodyPr/>
+          <a:lstStyle/>
+          <a:p>
+            <a:pPr marL="0" indent="0" algn="ctr">
+              <a:buNone/>
+            </a:pPr>
+            <a:r>
+              <a:rPr lang="en-US" sz="6600" dirty="0" smtClean="0"/>
+              <a:t>Thanks!</a:t>
+            </a:r>
+            <a:endParaRPr lang="en-US" sz="6600" dirty="0" smtClean="0"/>
+          </a:p>
+          <a:p>
+            <a:endParaRPr lang="en-US" dirty="0" smtClean="0"/>
+          </a:p>
+        </p:txBody>
+      </p:sp>
+    </p:spTree>
+    <p:extLst>
+      <p:ext uri="{BB962C8B-B14F-4D97-AF65-F5344CB8AC3E}">
+        <p14:creationId xmlns:p14="http://schemas.microsoft.com/office/powerpoint/2010/main" val="1297033223"/>
+      </p:ext>
+    </p:extLst>
+  </p:cSld>
+  <p:clrMapOvr>
+    <a:masterClrMapping/>
+  </p:clrMapOvr>
+  <p:timing>
+    <p:tnLst>
+      <p:par>
+        <p:cTn xmlns:p14="http://schemas.microsoft.com/office/powerpoint/2010/main" id="1" dur="indefinite" restart="never" nodeType="tmRoot"/>
+      </p:par>
+    </p:tnLst>
+  </p:timing>
 </p:sld>
 </file>
 
@@ -7072,7 +7346,7 @@
           <a:p>
             <a:r>
               <a:rPr lang="en-US" dirty="0" smtClean="0"/>
-              <a:t>We’ll talk about…</a:t>
+              <a:t>Thanks &amp; Inspiration</a:t>
             </a:r>
             <a:endParaRPr lang="en-US" dirty="0"/>
           </a:p>
@@ -7093,86 +7367,75 @@
           <a:bodyPr/>
           <a:lstStyle/>
           <a:p>
+            <a:r>
+              <a:rPr lang="en-US" dirty="0" smtClean="0"/>
+              <a:t>Ben </a:t>
+            </a:r>
+            <a:r>
+              <a:rPr lang="en-US" dirty="0" err="1" smtClean="0"/>
+              <a:t>Lesh</a:t>
+            </a:r>
+            <a:endParaRPr lang="en-US" dirty="0" smtClean="0"/>
+          </a:p>
+          <a:p>
+            <a:pPr lvl="1"/>
             <a:r>
               <a:rPr lang="en-US" dirty="0" err="1" smtClean="0"/>
               <a:t>AngularJS</a:t>
             </a:r>
             <a:r>
               <a:rPr lang="en-US" dirty="0" smtClean="0"/>
-              <a:t> Unit Testing background</a:t>
+              <a:t> Unit Testing Blog posts</a:t>
             </a:r>
           </a:p>
           <a:p>
             <a:pPr lvl="1"/>
             <a:r>
-              <a:rPr lang="en-US" dirty="0" smtClean="0"/>
-              <a:t>Modules, injectors</a:t>
+              <a:rPr lang="en-US" dirty="0">
+                <a:hlinkClick r:id="rId2"/>
+              </a:rPr>
+              <a:t>http://www.benlesh.com/search/label/Unit%</a:t>
+            </a:r>
+            <a:r>
+              <a:rPr lang="en-US" dirty="0" smtClean="0">
+                <a:hlinkClick r:id="rId2"/>
+              </a:rPr>
+              <a:t>20Testing</a:t>
+            </a:r>
+            <a:endParaRPr lang="en-US" dirty="0" smtClean="0"/>
+          </a:p>
+          <a:p>
+            <a:r>
+              <a:rPr lang="en-US" dirty="0" smtClean="0"/>
+              <a:t>Darren Nelsen</a:t>
             </a:r>
           </a:p>
           <a:p>
             <a:pPr lvl="1"/>
             <a:r>
               <a:rPr lang="en-US" dirty="0" smtClean="0"/>
-              <a:t>Spies</a:t>
+              <a:t>Topic idea</a:t>
             </a:r>
           </a:p>
           <a:p>
             <a:pPr lvl="1"/>
-            <a:r>
-              <a:rPr lang="en-US" dirty="0" err="1" smtClean="0"/>
-              <a:t>httpBackend</a:t>
-            </a:r>
+            <a:endParaRPr lang="en-US" dirty="0" smtClean="0"/>
+          </a:p>
+          <a:p>
             <a:endParaRPr lang="en-US" dirty="0"/>
-          </a:p>
-          <a:p>
-            <a:r>
-              <a:rPr lang="en-US" dirty="0" smtClean="0"/>
-              <a:t>Examples &amp; Techniques for unit testing </a:t>
-            </a:r>
-          </a:p>
-          <a:p>
-            <a:pPr lvl="1"/>
-            <a:r>
-              <a:rPr lang="en-US" dirty="0" smtClean="0"/>
-              <a:t>Controllers</a:t>
-            </a:r>
-          </a:p>
-          <a:p>
-            <a:pPr lvl="1"/>
-            <a:r>
-              <a:rPr lang="en-US" dirty="0" smtClean="0"/>
-              <a:t>Services</a:t>
-            </a:r>
-          </a:p>
-          <a:p>
-            <a:pPr lvl="1"/>
-            <a:r>
-              <a:rPr lang="en-US" dirty="0" smtClean="0"/>
-              <a:t>Directives</a:t>
-            </a:r>
-          </a:p>
-          <a:p>
-            <a:endParaRPr lang="en-US" dirty="0" smtClean="0"/>
           </a:p>
         </p:txBody>
       </p:sp>
     </p:spTree>
     <p:extLst>
       <p:ext uri="{BB962C8B-B14F-4D97-AF65-F5344CB8AC3E}">
-        <p14:creationId xmlns:p14="http://schemas.microsoft.com/office/powerpoint/2010/main" val="607747868"/>
+        <p14:creationId xmlns:p14="http://schemas.microsoft.com/office/powerpoint/2010/main" val="1427093847"/>
       </p:ext>
     </p:extLst>
   </p:cSld>
   <p:clrMapOvr>
     <a:masterClrMapping/>
   </p:clrMapOvr>
-  <p:timing>
-    <p:tnLst>
-      <p:par>
-        <p:cTn xmlns:p14="http://schemas.microsoft.com/office/powerpoint/2010/main" id="1" dur="indefinite" restart="never" nodeType="tmRoot"/>
-      </p:par>
-    </p:tnLst>
-  </p:timing>
 </p:sld>
 </file>
 
@@ -7210,7 +7473,7 @@
           <a:p>
             <a:r>
               <a:rPr lang="en-US" dirty="0" smtClean="0"/>
-              <a:t>Unit Test background</a:t>
+              <a:t>We’ll talk about…</a:t>
             </a:r>
             <a:endParaRPr lang="en-US" dirty="0"/>
           </a:p>
@@ -7232,95 +7495,62 @@
           <a:lstStyle/>
           <a:p>
             <a:r>
-              <a:rPr lang="en-US" dirty="0" smtClean="0"/>
-              <a:t>Karma</a:t>
+              <a:rPr lang="en-US" dirty="0" err="1" smtClean="0"/>
+              <a:t>AngularJS</a:t>
+            </a:r>
+            <a:r>
+              <a:rPr lang="en-US" dirty="0" smtClean="0"/>
+              <a:t> Unit Testing background</a:t>
             </a:r>
           </a:p>
           <a:p>
             <a:pPr lvl="1"/>
             <a:r>
               <a:rPr lang="en-US" dirty="0" smtClean="0"/>
-              <a:t>Test runner</a:t>
+              <a:t>Modules, injectors</a:t>
             </a:r>
           </a:p>
           <a:p>
             <a:pPr lvl="1"/>
             <a:r>
-              <a:rPr lang="en-US" dirty="0"/>
-              <a:t>http://karma-</a:t>
-            </a:r>
-            <a:r>
-              <a:rPr lang="en-US" dirty="0" err="1"/>
-              <a:t>runner.github.io</a:t>
-            </a:r>
-            <a:r>
-              <a:rPr lang="en-US" dirty="0"/>
-              <a:t>/0.10/</a:t>
-            </a:r>
-            <a:r>
-              <a:rPr lang="en-US" dirty="0" err="1"/>
-              <a:t>index.html</a:t>
-            </a:r>
-            <a:endParaRPr lang="en-US" dirty="0" smtClean="0"/>
-          </a:p>
-          <a:p>
-            <a:r>
-              <a:rPr lang="en-US" dirty="0" smtClean="0"/>
-              <a:t>Jasmine</a:t>
+              <a:rPr lang="en-US" dirty="0" smtClean="0"/>
+              <a:t>Spies</a:t>
             </a:r>
           </a:p>
           <a:p>
             <a:pPr lvl="1"/>
             <a:r>
-              <a:rPr lang="en-US" dirty="0" smtClean="0"/>
-              <a:t>Test Framework</a:t>
+              <a:rPr lang="en-US" dirty="0" err="1" smtClean="0"/>
+              <a:t>httpBackend</a:t>
+            </a:r>
+            <a:endParaRPr lang="en-US" dirty="0"/>
+          </a:p>
+          <a:p>
+            <a:r>
+              <a:rPr lang="en-US" dirty="0" smtClean="0"/>
+              <a:t>Examples &amp; Techniques for unit testing </a:t>
             </a:r>
           </a:p>
           <a:p>
             <a:pPr lvl="1"/>
             <a:r>
-              <a:rPr lang="en-US" dirty="0">
-                <a:hlinkClick r:id="rId3"/>
-              </a:rPr>
-              <a:t>http://pivotal.github.io/jasmine/</a:t>
-            </a:r>
-            <a:endParaRPr lang="en-US" dirty="0"/>
+              <a:rPr lang="en-US" dirty="0" smtClean="0"/>
+              <a:t>Controllers</a:t>
+            </a:r>
           </a:p>
           <a:p>
             <a:pPr lvl="1"/>
             <a:r>
               <a:rPr lang="en-US" dirty="0" smtClean="0"/>
-              <a:t>describe/it style like </a:t>
-            </a:r>
-            <a:r>
-              <a:rPr lang="en-US" dirty="0" err="1" smtClean="0"/>
-              <a:t>rspec</a:t>
-            </a:r>
-            <a:endParaRPr lang="en-US" dirty="0" smtClean="0"/>
+              <a:t>Services</a:t>
+            </a:r>
           </a:p>
           <a:p>
             <a:pPr lvl="1"/>
             <a:r>
               <a:rPr lang="en-US" dirty="0" smtClean="0"/>
-              <a:t>expect(x).</a:t>
-            </a:r>
-            <a:r>
-              <a:rPr lang="en-US" dirty="0" err="1" smtClean="0"/>
-              <a:t>toEqual</a:t>
-            </a:r>
-            <a:r>
-              <a:rPr lang="en-US" dirty="0" smtClean="0"/>
-              <a:t>(y) assertion style</a:t>
-            </a:r>
-          </a:p>
-          <a:p>
-            <a:pPr marL="0" indent="0">
-              <a:buNone/>
-            </a:pPr>
-            <a:endParaRPr lang="en-US" dirty="0" smtClean="0"/>
-          </a:p>
-          <a:p>
-            <a:endParaRPr lang="en-US" dirty="0" smtClean="0"/>
+              <a:t>Directives</a:t>
+            </a:r>
           </a:p>
           <a:p>
             <a:endParaRPr lang="en-US" dirty="0" smtClean="0"/>
@@ -7330,7 +7560,7 @@
     </p:spTree>
     <p:extLst>
       <p:ext uri="{BB962C8B-B14F-4D97-AF65-F5344CB8AC3E}">
-        <p14:creationId xmlns:p14="http://schemas.microsoft.com/office/powerpoint/2010/main" val="1826875320"/>
+        <p14:creationId xmlns:p14="http://schemas.microsoft.com/office/powerpoint/2010/main" val="607747868"/>
       </p:ext>
     </p:extLst>
   </p:cSld>
@@ -7381,7 +7611,7 @@
           <a:p>
             <a:r>
               <a:rPr lang="en-US" dirty="0" smtClean="0"/>
-              <a:t>Module</a:t>
+              <a:t>Unit Test background</a:t>
             </a:r>
             <a:endParaRPr lang="en-US" dirty="0"/>
           </a:p>
@@ -7397,62 +7627,91 @@
             <p:ph idx="1"/>
           </p:nvPr>
         </p:nvSpPr>
-        <p:spPr>
-          <a:xfrm>
-            <a:off x="744360" y="747533"/>
-            <a:ext cx="7543800" cy="3886200"/>
-          </a:xfrm>
-        </p:spPr>
-        <p:txBody>
-          <a:bodyPr>
-            <a:normAutofit/>
-          </a:bodyPr>
-          <a:lstStyle/>
-          <a:p>
-            <a:pPr marL="0" indent="0">
-              <a:buNone/>
-            </a:pPr>
-            <a:r>
-              <a:rPr lang="en-US" dirty="0" smtClean="0"/>
-              <a:t>// Triggers re-creation of all </a:t>
+        <p:spPr/>
+        <p:txBody>
+          <a:bodyPr/>
+          <a:lstStyle/>
+          <a:p>
+            <a:r>
+              <a:rPr lang="en-US" dirty="0" smtClean="0"/>
+              <a:t>Karma</a:t>
+            </a:r>
+          </a:p>
+          <a:p>
+            <a:pPr lvl="1"/>
+            <a:r>
+              <a:rPr lang="en-US" dirty="0" smtClean="0"/>
+              <a:t>Test runner</a:t>
+            </a:r>
+          </a:p>
+          <a:p>
+            <a:pPr lvl="1"/>
+            <a:r>
+              <a:rPr lang="en-US" dirty="0"/>
+              <a:t>http://karma-</a:t>
+            </a:r>
+            <a:r>
+              <a:rPr lang="en-US" dirty="0" err="1"/>
+              <a:t>runner.github.io</a:t>
+            </a:r>
+            <a:r>
+              <a:rPr lang="en-US" dirty="0"/>
+              <a:t>/0.10/</a:t>
+            </a:r>
+            <a:r>
+              <a:rPr lang="en-US" dirty="0" err="1"/>
+              <a:t>index.html</a:t>
+            </a:r>
+            <a:endParaRPr lang="en-US" dirty="0" smtClean="0"/>
+          </a:p>
+          <a:p>
+            <a:r>
+              <a:rPr lang="en-US" dirty="0" smtClean="0"/>
+              <a:t>Jasmine</a:t>
+            </a:r>
+          </a:p>
+          <a:p>
+            <a:pPr lvl="1"/>
+            <a:r>
+              <a:rPr lang="en-US" dirty="0" smtClean="0"/>
+              <a:t>Test Framework</a:t>
+            </a:r>
+          </a:p>
+          <a:p>
+            <a:pPr lvl="1"/>
+            <a:r>
+              <a:rPr lang="en-US" dirty="0">
+                <a:hlinkClick r:id="rId3"/>
+              </a:rPr>
+              <a:t>http://pivotal.github.io/jasmine/</a:t>
+            </a:r>
+            <a:endParaRPr lang="en-US" dirty="0"/>
+          </a:p>
+          <a:p>
+            <a:pPr lvl="1"/>
+            <a:r>
+              <a:rPr lang="en-US" dirty="0" smtClean="0"/>
+              <a:t>describe/it style like </a:t>
             </a:r>
             <a:r>
               <a:rPr lang="en-US" dirty="0" err="1" smtClean="0"/>
-              <a:t>controlelrs</a:t>
-            </a:r>
-            <a:r>
-              <a:rPr lang="en-US" dirty="0" smtClean="0"/>
-              <a:t>, services directives</a:t>
-            </a:r>
-          </a:p>
-          <a:p>
-            <a:pPr marL="0" indent="0">
-              <a:buNone/>
-            </a:pPr>
-            <a:r>
-              <a:rPr lang="en-US" dirty="0" smtClean="0"/>
-              <a:t>// Place to mock services used by the service you are testing.</a:t>
-            </a:r>
-          </a:p>
-          <a:p>
-            <a:pPr marL="0" indent="0">
-              <a:buNone/>
-            </a:pPr>
+              <a:t>rspec</a:t>
+            </a:r>
+            <a:endParaRPr lang="en-US" dirty="0" smtClean="0"/>
+          </a:p>
+          <a:p>
+            <a:pPr lvl="1"/>
+            <a:r>
+              <a:rPr lang="en-US" dirty="0" smtClean="0"/>
+              <a:t>expect(x).</a:t>
+            </a:r>
             <a:r>
               <a:rPr lang="en-US" dirty="0" err="1" smtClean="0"/>
-              <a:t>beforeEach</a:t>
-            </a:r>
-            <a:r>
-              <a:rPr lang="en-US" dirty="0" smtClean="0"/>
-              <a:t>(module(‘</a:t>
-            </a:r>
-            <a:r>
-              <a:rPr lang="en-US" dirty="0" err="1" smtClean="0"/>
-              <a:t>githubViewApp</a:t>
-            </a:r>
-            <a:r>
-              <a:rPr lang="en-US" dirty="0" smtClean="0"/>
-              <a:t>’));</a:t>
+              <a:t>toEqual</a:t>
+            </a:r>
+            <a:r>
+              <a:rPr lang="en-US" dirty="0" smtClean="0"/>
+              <a:t>(y) assertion style</a:t>
             </a:r>
           </a:p>
           <a:p>
@@ -7462,83 +7721,17 @@
             <a:endParaRPr lang="en-US" dirty="0" smtClean="0"/>
           </a:p>
           <a:p>
-            <a:pPr marL="0" indent="0">
-              <a:buNone/>
-            </a:pPr>
-            <a:r>
-              <a:rPr lang="en-US" dirty="0" smtClean="0"/>
-              <a:t>module(‘</a:t>
-            </a:r>
-            <a:r>
-              <a:rPr lang="en-US" dirty="0" err="1" smtClean="0"/>
-              <a:t>githubViewApp</a:t>
-            </a:r>
-            <a:r>
-              <a:rPr lang="en-US" dirty="0" smtClean="0"/>
-              <a:t>’, function(</a:t>
-            </a:r>
-            <a:r>
-              <a:rPr lang="en-US" b="1" dirty="0" smtClean="0"/>
-              <a:t>$provide</a:t>
-            </a:r>
-            <a:r>
-              <a:rPr lang="en-US" dirty="0" smtClean="0"/>
-              <a:t>) {</a:t>
-            </a:r>
-          </a:p>
-          <a:p>
-            <a:pPr marL="0" indent="0">
-              <a:buNone/>
-            </a:pPr>
-            <a:r>
-              <a:rPr lang="en-US" dirty="0"/>
-              <a:t> </a:t>
-            </a:r>
-            <a:r>
-              <a:rPr lang="en-US" dirty="0" smtClean="0"/>
-              <a:t> </a:t>
-            </a:r>
-            <a:r>
-              <a:rPr lang="en-US" b="1" dirty="0" smtClean="0"/>
-              <a:t>$</a:t>
-            </a:r>
-            <a:r>
-              <a:rPr lang="en-US" b="1" dirty="0" err="1" smtClean="0"/>
-              <a:t>provide</a:t>
-            </a:r>
-            <a:r>
-              <a:rPr lang="en-US" dirty="0" err="1" smtClean="0"/>
-              <a:t>.value</a:t>
-            </a:r>
-            <a:r>
-              <a:rPr lang="en-US" dirty="0" smtClean="0"/>
-              <a:t>(‘x’, </a:t>
-            </a:r>
-            <a:r>
-              <a:rPr lang="en-US" dirty="0" err="1" smtClean="0"/>
-              <a:t>mockX</a:t>
-            </a:r>
-            <a:r>
-              <a:rPr lang="en-US" dirty="0" smtClean="0"/>
-              <a:t>);</a:t>
-            </a:r>
-          </a:p>
-          <a:p>
-            <a:pPr marL="0" indent="0">
-              <a:buNone/>
-            </a:pPr>
-            <a:r>
-              <a:rPr lang="en-US" dirty="0" smtClean="0"/>
-              <a:t>});</a:t>
-            </a:r>
-            <a:endParaRPr lang="en-US" dirty="0"/>
+            <a:endParaRPr lang="en-US" dirty="0" smtClean="0"/>
+          </a:p>
+          <a:p>
+            <a:endParaRPr lang="en-US" dirty="0" smtClean="0"/>
           </a:p>
         </p:txBody>
       </p:sp>
     </p:spTree>
     <p:extLst>
       <p:ext uri="{BB962C8B-B14F-4D97-AF65-F5344CB8AC3E}">
-        <p14:creationId xmlns:p14="http://schemas.microsoft.com/office/powerpoint/2010/main" val="3852319304"/>
+        <p14:creationId xmlns:p14="http://schemas.microsoft.com/office/powerpoint/2010/main" val="1826875320"/>
       </p:ext>
     </p:extLst>
   </p:cSld>
@@ -7589,7 +7782,7 @@
           <a:p>
             <a:r>
               <a:rPr lang="en-US" dirty="0" smtClean="0"/>
-              <a:t>Inject</a:t>
+              <a:t>Module</a:t>
             </a:r>
             <a:endParaRPr lang="en-US" dirty="0"/>
           </a:p>
@@ -7605,17 +7798,33 @@
             <p:ph idx="1"/>
           </p:nvPr>
         </p:nvSpPr>
-        <p:spPr/>
+        <p:spPr>
+          <a:xfrm>
+            <a:off x="744360" y="747533"/>
+            <a:ext cx="7543800" cy="3886200"/>
+          </a:xfrm>
+        </p:spPr>
         <p:txBody>
           <a:bodyPr>
-            <a:normAutofit fontScale="92500" lnSpcReduction="20000"/>
+            <a:normAutofit/>
           </a:bodyPr>
           <a:lstStyle/>
           <a:p>
             <a:pPr marL="0" indent="0">
               <a:buNone/>
             </a:pPr>
-            <a:endParaRPr lang="en-US" dirty="0"/>
+            <a:r>
+              <a:rPr lang="en-US" dirty="0" smtClean="0"/>
+              <a:t>// Triggers re-creation of all </a:t>
+            </a:r>
+            <a:r>
+              <a:rPr lang="en-US" dirty="0" err="1" smtClean="0"/>
+              <a:t>controlelrs</a:t>
+            </a:r>
+            <a:r>
+              <a:rPr lang="en-US" dirty="0" smtClean="0"/>
+              <a:t>, services directives</a:t>
+            </a:r>
           </a:p>
           <a:p>
             <a:pPr marL="0" indent="0">
@@ -7623,7 +7832,7 @@
             </a:pPr>
             <a:r>
               <a:rPr lang="en-US" dirty="0" smtClean="0"/>
-              <a:t>// Provide access to angular and user services in your test.</a:t>
+              <a:t>// Place to mock services used by the service you are testing.</a:t>
             </a:r>
           </a:p>
           <a:p>
@@ -7631,37 +7840,64 @@
               <a:buNone/>
             </a:pPr>
             <a:r>
+              <a:rPr lang="en-US" dirty="0" err="1" smtClean="0"/>
+              <a:t>beforeEach</a:t>
+            </a:r>
+            <a:r>
+              <a:rPr lang="en-US" dirty="0" smtClean="0"/>
+              <a:t>(module(‘</a:t>
+            </a:r>
+            <a:r>
+              <a:rPr lang="en-US" dirty="0" err="1" smtClean="0"/>
+              <a:t>githubViewApp</a:t>
+            </a:r>
+            <a:r>
+              <a:rPr lang="en-US" dirty="0" smtClean="0"/>
+              <a:t>’));</a:t>
+            </a:r>
+          </a:p>
+          <a:p>
+            <a:pPr marL="0" indent="0">
+              <a:buNone/>
+            </a:pPr>
+            <a:endParaRPr lang="en-US" dirty="0" smtClean="0"/>
+          </a:p>
+          <a:p>
+            <a:pPr marL="0" indent="0">
+              <a:buNone/>
+            </a:pPr>
+            <a:r>
+              <a:rPr lang="en-US" dirty="0" smtClean="0"/>
+              <a:t>module(‘</a:t>
+            </a:r>
+            <a:r>
+              <a:rPr lang="en-US" dirty="0" err="1" smtClean="0"/>
+              <a:t>githubViewApp</a:t>
+            </a:r>
+            <a:r>
+              <a:rPr lang="en-US" dirty="0" smtClean="0"/>
+              <a:t>’, function(</a:t>
+            </a:r>
+            <a:r>
+              <a:rPr lang="en-US" b="1" dirty="0" smtClean="0"/>
+              <a:t>$provide</a:t>
+            </a:r>
+            <a:r>
+              <a:rPr lang="en-US" dirty="0" smtClean="0"/>
+              <a:t>) {</a:t>
+            </a:r>
+          </a:p>
+          <a:p>
+            <a:pPr marL="0" indent="0">
+              <a:buNone/>
+            </a:pPr>
+            <a:r>
               <a:rPr lang="en-US" dirty="0"/>
-              <a:t>i</a:t>
-            </a:r>
-            <a:r>
-              <a:rPr lang="en-US" dirty="0" smtClean="0"/>
-              <a:t>t(‘gets access to services with inject’, </a:t>
-            </a:r>
-            <a:r>
-              <a:rPr lang="en-US" b="1" dirty="0" smtClean="0"/>
-              <a:t>inject</a:t>
-            </a:r>
-            <a:r>
-              <a:rPr lang="en-US" dirty="0" smtClean="0"/>
-              <a:t>(function(</a:t>
-            </a:r>
-            <a:r>
-              <a:rPr lang="en-US" b="1" dirty="0" smtClean="0"/>
-              <a:t>$window</a:t>
-            </a:r>
-            <a:r>
-              <a:rPr lang="en-US" dirty="0" smtClean="0"/>
-              <a:t>){</a:t>
-            </a:r>
-          </a:p>
-          <a:p>
-            <a:pPr marL="0" indent="0">
-              <a:buNone/>
-            </a:pPr>
-            <a:r>
-              <a:rPr lang="en-US" dirty="0" smtClean="0"/>
-              <a:t>  </a:t>
+              <a:t> </a:t>
+            </a:r>
+            <a:r>
+              <a:rPr lang="en-US" dirty="0" smtClean="0"/>
+              <a:t> </a:t>
             </a:r>
             <a:r>
               <a:rPr lang="en-US" b="1" dirty="0" smtClean="0"/>
@@ -7669,118 +7905,41 @@
             </a:r>
             <a:r>
               <a:rPr lang="en-US" b="1" dirty="0" err="1" smtClean="0"/>
-              <a:t>window</a:t>
+              <a:t>provide</a:t>
             </a:r>
             <a:r>
               <a:rPr lang="en-US" dirty="0" err="1" smtClean="0"/>
-              <a:t>.doSomething</a:t>
-            </a:r>
-            <a:r>
-              <a:rPr lang="en-US" dirty="0" smtClean="0"/>
-              <a:t>();</a:t>
+              <a:t>.value</a:t>
+            </a:r>
+            <a:r>
+              <a:rPr lang="en-US" dirty="0" smtClean="0"/>
+              <a:t>(‘x’, </a:t>
+            </a:r>
+            <a:r>
+              <a:rPr lang="en-US" dirty="0" err="1" smtClean="0"/>
+              <a:t>mockX</a:t>
+            </a:r>
+            <a:r>
+              <a:rPr lang="en-US" dirty="0" smtClean="0"/>
+              <a:t>);</a:t>
             </a:r>
           </a:p>
           <a:p>
             <a:pPr marL="0" indent="0">
               <a:buNone/>
             </a:pPr>
+            <a:r>
+              <a:rPr lang="en-US" dirty="0" smtClean="0"/>
+              <a:t>});</a:t>
+            </a:r>
             <a:endParaRPr lang="en-US" dirty="0"/>
-          </a:p>
-          <a:p>
-            <a:pPr marL="0" indent="0">
-              <a:buNone/>
-            </a:pPr>
-            <a:r>
-              <a:rPr lang="en-US" dirty="0"/>
-              <a:t> </a:t>
-            </a:r>
-            <a:r>
-              <a:rPr lang="en-US" dirty="0" smtClean="0"/>
-              <a:t> // also works standalone</a:t>
-            </a:r>
-          </a:p>
-          <a:p>
-            <a:pPr marL="0" indent="0">
-              <a:buNone/>
-            </a:pPr>
-            <a:r>
-              <a:rPr lang="en-US" dirty="0" smtClean="0"/>
-              <a:t>  </a:t>
-            </a:r>
-            <a:r>
-              <a:rPr lang="en-US" b="1" dirty="0" smtClean="0"/>
-              <a:t>inject</a:t>
-            </a:r>
-            <a:r>
-              <a:rPr lang="en-US" dirty="0" smtClean="0"/>
-              <a:t>(function(</a:t>
-            </a:r>
-            <a:r>
-              <a:rPr lang="en-US" b="1" dirty="0" smtClean="0"/>
-              <a:t>$q</a:t>
-            </a:r>
-            <a:r>
-              <a:rPr lang="en-US" dirty="0" smtClean="0"/>
-              <a:t>) {</a:t>
-            </a:r>
-          </a:p>
-          <a:p>
-            <a:pPr marL="0" indent="0">
-              <a:buNone/>
-            </a:pPr>
-            <a:r>
-              <a:rPr lang="en-US" dirty="0"/>
-              <a:t> </a:t>
-            </a:r>
-            <a:r>
-              <a:rPr lang="en-US" dirty="0" smtClean="0"/>
-              <a:t>    </a:t>
-            </a:r>
-            <a:r>
-              <a:rPr lang="en-US" b="1" dirty="0" smtClean="0"/>
-              <a:t>$</a:t>
-            </a:r>
-            <a:r>
-              <a:rPr lang="en-US" b="1" dirty="0" err="1" smtClean="0"/>
-              <a:t>q</a:t>
-            </a:r>
-            <a:r>
-              <a:rPr lang="en-US" dirty="0" err="1" smtClean="0"/>
-              <a:t>.when</a:t>
-            </a:r>
-            <a:r>
-              <a:rPr lang="en-US" dirty="0" smtClean="0"/>
-              <a:t>(‘bar’);</a:t>
-            </a:r>
-          </a:p>
-          <a:p>
-            <a:pPr marL="0" indent="0">
-              <a:buNone/>
-            </a:pPr>
-            <a:r>
-              <a:rPr lang="en-US" dirty="0"/>
-              <a:t> </a:t>
-            </a:r>
-            <a:r>
-              <a:rPr lang="en-US" dirty="0" smtClean="0"/>
-              <a:t> });</a:t>
-            </a:r>
-          </a:p>
-          <a:p>
-            <a:pPr marL="0" indent="0">
-              <a:buNone/>
-            </a:pPr>
-            <a:r>
-              <a:rPr lang="en-US" dirty="0" smtClean="0"/>
-              <a:t>});</a:t>
-            </a:r>
           </a:p>
         </p:txBody>
       </p:sp>
     </p:spTree>
     <p:extLst>
       <p:ext uri="{BB962C8B-B14F-4D97-AF65-F5344CB8AC3E}">
-        <p14:creationId xmlns:p14="http://schemas.microsoft.com/office/powerpoint/2010/main" val="2818609453"/>
+        <p14:creationId xmlns:p14="http://schemas.microsoft.com/office/powerpoint/2010/main" val="3852319304"/>
       </p:ext>
     </p:extLst>
   </p:cSld>
@@ -7831,7 +7990,7 @@
           <a:p>
             <a:r>
               <a:rPr lang="en-US" dirty="0" smtClean="0"/>
-              <a:t>Spies</a:t>
+              <a:t>Inject</a:t>
             </a:r>
             <a:endParaRPr lang="en-US" dirty="0"/>
           </a:p>
@@ -7850,59 +8009,179 @@
         <p:spPr/>
         <p:txBody>
           <a:bodyPr>
-            <a:normAutofit/>
+            <a:normAutofit fontScale="92500" lnSpcReduction="20000"/>
           </a:bodyPr>
           <a:lstStyle/>
           <a:p>
             <a:pPr marL="0" indent="0">
               <a:buNone/>
             </a:pPr>
-            <a:r>
-              <a:rPr lang="en-US" dirty="0" smtClean="0"/>
-              <a:t>callback = </a:t>
+            <a:endParaRPr lang="en-US" dirty="0"/>
+          </a:p>
+          <a:p>
+            <a:pPr marL="0" indent="0">
+              <a:buNone/>
+            </a:pPr>
+            <a:r>
+              <a:rPr lang="en-US" dirty="0" smtClean="0"/>
+              <a:t>// Provide access to angular and user services in your test.</a:t>
+            </a:r>
+          </a:p>
+          <a:p>
+            <a:pPr marL="0" indent="0">
+              <a:buNone/>
+            </a:pPr>
+            <a:r>
+              <a:rPr lang="en-US" dirty="0"/>
+              <a:t>i</a:t>
+            </a:r>
+            <a:r>
+              <a:rPr lang="en-US" dirty="0" smtClean="0"/>
+              <a:t>t(‘gets access to services with inject’, </a:t>
+            </a:r>
+            <a:r>
+              <a:rPr lang="en-US" b="1" dirty="0" smtClean="0"/>
+              <a:t>inject</a:t>
+            </a:r>
+            <a:r>
+              <a:rPr lang="en-US" dirty="0" smtClean="0"/>
+              <a:t>(function(</a:t>
+            </a:r>
+            <a:r>
+              <a:rPr lang="en-US" b="1" dirty="0" smtClean="0"/>
+              <a:t>$window</a:t>
+            </a:r>
+            <a:r>
+              <a:rPr lang="en-US" dirty="0" smtClean="0"/>
+              <a:t>){</a:t>
+            </a:r>
+          </a:p>
+          <a:p>
+            <a:pPr marL="0" indent="0">
+              <a:buNone/>
+            </a:pPr>
+            <a:r>
+              <a:rPr lang="en-US" dirty="0" smtClean="0"/>
+              <a:t>  </a:t>
+            </a:r>
+            <a:r>
+              <a:rPr lang="en-US" b="1" dirty="0" smtClean="0"/>
+              <a:t>$</a:t>
+            </a:r>
+            <a:r>
+              <a:rPr lang="en-US" b="1" dirty="0" err="1" smtClean="0"/>
+              <a:t>window</a:t>
             </a:r>
             <a:r>
               <a:rPr lang="en-US" dirty="0" err="1" smtClean="0"/>
-              <a:t>jasmine.createSpy</a:t>
-            </a:r>
-            <a:r>
-              <a:rPr lang="en-US" dirty="0" smtClean="0"/>
-              <a:t>(‘callback’);</a:t>
+              <a:t>.doSomething</a:t>
+            </a:r>
+            <a:r>
+              <a:rPr lang="en-US" dirty="0" smtClean="0"/>
+              <a:t>();</a:t>
             </a:r>
           </a:p>
           <a:p>
             <a:pPr marL="0" indent="0">
               <a:buNone/>
             </a:pPr>
-            <a:r>
-              <a:rPr lang="en-US" dirty="0" smtClean="0"/>
-              <a:t>foo(callback);</a:t>
-            </a:r>
+            <a:endParaRPr lang="en-US" dirty="0"/>
           </a:p>
           <a:p>
             <a:pPr marL="0" indent="0">
               <a:buNone/>
             </a:pPr>
             <a:r>
-              <a:rPr lang="en-US" dirty="0" smtClean="0"/>
-              <a:t>expect(callback).</a:t>
+              <a:rPr lang="en-US" dirty="0"/>
+              <a:t> </a:t>
+            </a:r>
+            <a:r>
+              <a:rPr lang="en-US" dirty="0" smtClean="0"/>
+              <a:t> // also works standalone</a:t>
+            </a:r>
+          </a:p>
+          <a:p>
+            <a:pPr marL="0" indent="0">
+              <a:buNone/>
+            </a:pPr>
+            <a:r>
+              <a:rPr lang="en-US" dirty="0" smtClean="0"/>
+              <a:t>  </a:t>
+            </a:r>
+            <a:r>
+              <a:rPr lang="en-US" b="1" dirty="0" smtClean="0"/>
+              <a:t>inject</a:t>
+            </a:r>
+            <a:r>
+              <a:rPr lang="en-US" dirty="0" smtClean="0"/>
+              <a:t>(function(</a:t>
+            </a:r>
+            <a:r>
+              <a:rPr lang="en-US" b="1" dirty="0" smtClean="0"/>
+              <a:t>$q</a:t>
+            </a:r>
+            <a:r>
+              <a:rPr lang="en-US" dirty="0" smtClean="0"/>
+              <a:t>) {</a:t>
+            </a:r>
+          </a:p>
+          <a:p>
+            <a:pPr marL="0" indent="0">
+              <a:buNone/>
+            </a:pPr>
+            <a:r>
+              <a:rPr lang="en-US" dirty="0"/>
+              <a:t> </a:t>
+            </a:r>
+            <a:r>
+              <a:rPr lang="en-US" dirty="0" smtClean="0"/>
+              <a:t>    </a:t>
+            </a:r>
+            <a:r>
+              <a:rPr lang="en-US" b="1" dirty="0" smtClean="0"/>
+              <a:t>$</a:t>
+            </a:r>
+            <a:r>
+              <a:rPr lang="en-US" b="1" dirty="0" err="1" smtClean="0"/>
+              <a:t>q</a:t>
             </a:r>
             <a:r>
               <a:rPr lang="en-US" dirty="0" err="1" smtClean="0"/>
-              <a:t>toHaveBeenCalled</a:t>
-            </a:r>
-            <a:r>
-              <a:rPr lang="en-US" dirty="0" smtClean="0"/>
-              <a:t>();</a:t>
-            </a:r>
-            <a:endParaRPr lang="en-US" dirty="0"/>
+              <a:t>.when</a:t>
+            </a:r>
+            <a:r>
+              <a:rPr lang="en-US" dirty="0" smtClean="0"/>
+              <a:t>(‘bar’);</a:t>
+            </a:r>
+          </a:p>
+          <a:p>
+            <a:pPr marL="0" indent="0">
+              <a:buNone/>
+            </a:pPr>
+            <a:r>
+              <a:rPr lang="en-US" dirty="0"/>
+              <a:t> </a:t>
+            </a:r>
+            <a:r>
+              <a:rPr lang="en-US" dirty="0" smtClean="0"/>
+              <a:t> });</a:t>
+            </a:r>
+          </a:p>
+          <a:p>
+            <a:pPr marL="0" indent="0">
+              <a:buNone/>
+            </a:pPr>
+            <a:r>
+              <a:rPr lang="en-US" dirty="0" smtClean="0"/>
+              <a:t>});</a:t>
+            </a:r>
           </a:p>
         </p:txBody>
       </p:sp>
     </p:spTree>
     <p:extLst>
       <p:ext uri="{BB962C8B-B14F-4D97-AF65-F5344CB8AC3E}">
-        <p14:creationId xmlns:p14="http://schemas.microsoft.com/office/powerpoint/2010/main" val="1160900138"/>
+        <p14:creationId xmlns:p14="http://schemas.microsoft.com/office/powerpoint/2010/main" val="2818609453"/>
       </p:ext>
     </p:extLst>
   </p:cSld>
@@ -7952,8 +8231,8 @@
           <a:lstStyle/>
           <a:p>
             <a:r>
-              <a:rPr lang="en-US" dirty="0" err="1" smtClean="0"/>
-              <a:t>httpBackend</a:t>
+              <a:rPr lang="en-US" dirty="0" smtClean="0"/>
+              <a:t>Spies</a:t>
             </a:r>
             <a:endParaRPr lang="en-US" dirty="0"/>
           </a:p>
@@ -7980,30 +8259,25 @@
               <a:buNone/>
             </a:pPr>
             <a:r>
-              <a:rPr lang="en-US" b="1" dirty="0" err="1" smtClean="0"/>
-              <a:t>httpBackend</a:t>
-            </a:r>
-            <a:endParaRPr lang="en-US" b="1" dirty="0" smtClean="0"/>
+              <a:rPr lang="en-US" dirty="0" smtClean="0"/>
+              <a:t>callback = </a:t>
+            </a:r>
+            <a:r>
+              <a:rPr lang="en-US" dirty="0" err="1" smtClean="0"/>
+              <a:t>jasmine.createSpy</a:t>
+            </a:r>
+            <a:r>
+              <a:rPr lang="en-US" dirty="0" smtClean="0"/>
+              <a:t>(‘callback’);</a:t>
+            </a:r>
           </a:p>
           <a:p>
             <a:pPr marL="0" indent="0">
               <a:buNone/>
             </a:pPr>
             <a:r>
-              <a:rPr lang="en-US" b="1" dirty="0"/>
-              <a:t> </a:t>
-            </a:r>
-            <a:r>
-              <a:rPr lang="en-US" b="1" dirty="0" smtClean="0"/>
-              <a:t>   .</a:t>
-            </a:r>
-            <a:r>
-              <a:rPr lang="en-US" b="1" dirty="0" err="1" smtClean="0"/>
-              <a:t>expectGET</a:t>
-            </a:r>
-            <a:r>
-              <a:rPr lang="en-US" b="1" dirty="0" smtClean="0"/>
-              <a:t>(‘/foo/bar’)</a:t>
+              <a:rPr lang="en-US" dirty="0" smtClean="0"/>
+              <a:t>foo(callback);</a:t>
             </a:r>
           </a:p>
           <a:p>
@@ -8011,47 +8285,16 @@
               <a:buNone/>
             </a:pPr>
             <a:r>
-              <a:rPr lang="en-US" b="1" dirty="0"/>
-              <a:t> </a:t>
-            </a:r>
-            <a:r>
-              <a:rPr lang="en-US" b="1" dirty="0" smtClean="0"/>
-              <a:t>   .respond(200, {foo: bar});</a:t>
-            </a:r>
-          </a:p>
-          <a:p>
-            <a:pPr marL="0" indent="0">
-              <a:buNone/>
-            </a:pPr>
+              <a:rPr lang="en-US" dirty="0" smtClean="0"/>
+              <a:t>expect(callback).</a:t>
+            </a:r>
             <a:r>
               <a:rPr lang="en-US" dirty="0" err="1" smtClean="0"/>
-              <a:t>someServiceCall</a:t>
+              <a:t>toHaveBeenCalled</a:t>
             </a:r>
             <a:r>
               <a:rPr lang="en-US" dirty="0" smtClean="0"/>
               <a:t>();</a:t>
-            </a:r>
-          </a:p>
-          <a:p>
-            <a:pPr marL="0" indent="0">
-              <a:buNone/>
-            </a:pPr>
-            <a:r>
-              <a:rPr lang="en-US" b="1" dirty="0" err="1" smtClean="0"/>
-              <a:t>httpBackend.flush</a:t>
-            </a:r>
-            <a:r>
-              <a:rPr lang="en-US" b="1" dirty="0" smtClean="0"/>
-              <a:t>();</a:t>
-            </a:r>
-          </a:p>
-          <a:p>
-            <a:pPr marL="0" indent="0">
-              <a:buNone/>
-            </a:pPr>
-            <a:r>
-              <a:rPr lang="en-US" dirty="0" smtClean="0"/>
-              <a:t>expect(…);</a:t>
             </a:r>
             <a:endParaRPr lang="en-US" dirty="0"/>
           </a:p>
@@ -8060,7 +8303,7 @@
     </p:spTree>
     <p:extLst>
       <p:ext uri="{BB962C8B-B14F-4D97-AF65-F5344CB8AC3E}">
-        <p14:creationId xmlns:p14="http://schemas.microsoft.com/office/powerpoint/2010/main" val="3691750736"/>
+        <p14:creationId xmlns:p14="http://schemas.microsoft.com/office/powerpoint/2010/main" val="1160900138"/>
       </p:ext>
     </p:extLst>
   </p:cSld>
@@ -8106,61 +8349,132 @@
         </p:nvSpPr>
         <p:spPr/>
         <p:txBody>
+          <a:bodyPr/>
+          <a:lstStyle/>
+          <a:p>
+            <a:r>
+              <a:rPr lang="en-US" dirty="0" err="1" smtClean="0"/>
+              <a:t>httpBackend</a:t>
+            </a:r>
+            <a:endParaRPr lang="en-US" dirty="0"/>
+          </a:p>
+        </p:txBody>
+      </p:sp>
+      <p:sp>
+        <p:nvSpPr>
+          <p:cNvPr id="3" name="Content Placeholder 2"/>
+          <p:cNvSpPr>
+            <a:spLocks noGrp="1"/>
+          </p:cNvSpPr>
+          <p:nvPr>
+            <p:ph idx="1"/>
+          </p:nvPr>
+        </p:nvSpPr>
+        <p:spPr/>
+        <p:txBody>
           <a:bodyPr>
-            <a:normAutofit fontScale="90000"/>
+            <a:normAutofit/>
           </a:bodyPr>
           <a:lstStyle/>
           <a:p>
-            <a:r>
-              <a:rPr lang="en-US" dirty="0" smtClean="0"/>
-              <a:t>Example Problem: </a:t>
-            </a:r>
+            <a:pPr marL="0" indent="0">
+              <a:buNone/>
+            </a:pPr>
+            <a:r>
+              <a:rPr lang="en-US" b="1" dirty="0" err="1" smtClean="0"/>
+              <a:t>httpBackend</a:t>
+            </a:r>
+            <a:endParaRPr lang="en-US" b="1" dirty="0" smtClean="0"/>
+          </a:p>
+          <a:p>
+            <a:pPr marL="0" indent="0">
+              <a:buNone/>
+            </a:pPr>
+            <a:r>
+              <a:rPr lang="en-US" b="1" dirty="0"/>
+              <a:t> </a:t>
+            </a:r>
+            <a:r>
+              <a:rPr lang="en-US" b="1" dirty="0" smtClean="0"/>
+              <a:t>   .</a:t>
+            </a:r>
+            <a:r>
+              <a:rPr lang="en-US" b="1" dirty="0" err="1" smtClean="0"/>
+              <a:t>expectGET</a:t>
+            </a:r>
+            <a:r>
+              <a:rPr lang="en-US" b="1" dirty="0" smtClean="0"/>
+              <a:t>(‘/foo/bar’)</a:t>
+            </a:r>
+          </a:p>
+          <a:p>
+            <a:pPr marL="0" indent="0">
+              <a:buNone/>
+            </a:pPr>
+            <a:r>
+              <a:rPr lang="en-US" b="1" dirty="0"/>
+              <a:t> </a:t>
+            </a:r>
+            <a:r>
+              <a:rPr lang="en-US" b="1" dirty="0" smtClean="0"/>
+              <a:t>   .respond(200, {foo: bar});</a:t>
+            </a:r>
+          </a:p>
+          <a:p>
+            <a:pPr marL="0" indent="0">
+              <a:buNone/>
+            </a:pPr>
             <a:r>
               <a:rPr lang="en-US" dirty="0" err="1" smtClean="0"/>
-              <a:t>Github</a:t>
-            </a:r>
-            <a:r>
-              <a:rPr lang="en-US" dirty="0" smtClean="0"/>
-              <a:t> API</a:t>
+              <a:t>someServiceCall</a:t>
+            </a:r>
+            <a:r>
+              <a:rPr lang="en-US" dirty="0" smtClean="0"/>
+              <a:t>();</a:t>
+            </a:r>
+          </a:p>
+          <a:p>
+            <a:pPr marL="0" indent="0">
+              <a:buNone/>
+            </a:pPr>
+            <a:r>
+              <a:rPr lang="en-US" b="1" dirty="0" err="1" smtClean="0"/>
+              <a:t>httpBackend.flush</a:t>
+            </a:r>
+            <a:r>
+              <a:rPr lang="en-US" b="1" dirty="0" smtClean="0"/>
+              <a:t>();</a:t>
+            </a:r>
+          </a:p>
+          <a:p>
+            <a:pPr marL="0" indent="0">
+              <a:buNone/>
+            </a:pPr>
+            <a:r>
+              <a:rPr lang="en-US" dirty="0" smtClean="0"/>
+              <a:t>expect(…);</a:t>
             </a:r>
             <a:endParaRPr lang="en-US" dirty="0"/>
           </a:p>
         </p:txBody>
       </p:sp>
-      <p:pic>
-        <p:nvPicPr>
-          <p:cNvPr id="9" name="Content Placeholder 8"/>
-          <p:cNvPicPr>
-            <a:picLocks noGrp="1" noChangeAspect="1"/>
-          </p:cNvPicPr>
-          <p:nvPr>
-            <p:ph idx="1"/>
-          </p:nvPr>
-        </p:nvPicPr>
-        <p:blipFill>
-          <a:blip r:embed="rId2"/>
-          <a:srcRect t="5043" b="5043"/>
-          <a:stretch>
-            <a:fillRect/>
-          </a:stretch>
-        </p:blipFill>
-        <p:spPr>
-          <a:xfrm>
-            <a:off x="576782" y="773992"/>
-            <a:ext cx="7543800" cy="3886200"/>
-          </a:xfrm>
-        </p:spPr>
-      </p:pic>
     </p:spTree>
     <p:extLst>
       <p:ext uri="{BB962C8B-B14F-4D97-AF65-F5344CB8AC3E}">
-        <p14:creationId xmlns:p14="http://schemas.microsoft.com/office/powerpoint/2010/main" val="4164729179"/>
+        <p14:creationId xmlns:p14="http://schemas.microsoft.com/office/powerpoint/2010/main" val="3691750736"/>
       </p:ext>
     </p:extLst>
   </p:cSld>
   <p:clrMapOvr>
     <a:masterClrMapping/>
   </p:clrMapOvr>
+  <p:timing>
+    <p:tnLst>
+      <p:par>
+        <p:cTn xmlns:p14="http://schemas.microsoft.com/office/powerpoint/2010/main" id="1" dur="indefinite" restart="never" nodeType="tmRoot"/>
+      </p:par>
+    </p:tnLst>
+  </p:timing>
 </p:sld>
 </file>
 

</xml_diff>